<commit_message>
dodanie do prezentacji obrazkow od Alberta
</commit_message>
<xml_diff>
--- a/prezentacja/Hermes.pptx
+++ b/prezentacja/Hermes.pptx
@@ -17,6 +17,7 @@
     <p:sldId id="264" r:id="rId12"/>
     <p:sldId id="265" r:id="rId13"/>
     <p:sldId id="266" r:id="rId14"/>
+    <p:sldId id="267" r:id="rId15"/>
   </p:sldIdLst>
   <p:sldSz cx="12192000" cy="6858000"/>
   <p:notesSz cx="7559675" cy="10691812"/>
@@ -64,7 +65,7 @@
       </p:grpSpPr>
       <p:sp>
         <p:nvSpPr>
-          <p:cNvPr id="26" name="PlaceHolder 1"/>
+          <p:cNvPr id="23" name="PlaceHolder 1"/>
           <p:cNvSpPr>
             <a:spLocks noGrp="1"/>
           </p:cNvSpPr>
@@ -74,8 +75,8 @@
         </p:nvSpPr>
         <p:spPr>
           <a:xfrm>
-            <a:off x="838080" y="365040"/>
-            <a:ext cx="10515240" cy="1325520"/>
+            <a:off x="609480" y="273600"/>
+            <a:ext cx="10972440" cy="1144800"/>
           </a:xfrm>
           <a:prstGeom prst="rect">
             <a:avLst/>
@@ -84,13 +85,14 @@
         <p:txBody>
           <a:bodyPr lIns="0" rIns="0" tIns="0" bIns="0" anchor="ctr"/>
           <a:p>
-            <a:endParaRPr/>
-          </a:p>
-        </p:txBody>
-      </p:sp>
-      <p:sp>
-        <p:nvSpPr>
-          <p:cNvPr id="27" name="PlaceHolder 2"/>
+            <a:pPr algn="ctr"/>
+            <a:endParaRPr/>
+          </a:p>
+        </p:txBody>
+      </p:sp>
+      <p:sp>
+        <p:nvSpPr>
+          <p:cNvPr id="24" name="PlaceHolder 2"/>
           <p:cNvSpPr>
             <a:spLocks noGrp="1"/>
           </p:cNvSpPr>
@@ -100,8 +102,8 @@
         </p:nvSpPr>
         <p:spPr>
           <a:xfrm>
-            <a:off x="838080" y="1825560"/>
-            <a:ext cx="10515240" cy="2075040"/>
+            <a:off x="609480" y="1604520"/>
+            <a:ext cx="10972440" cy="1896840"/>
           </a:xfrm>
           <a:prstGeom prst="rect">
             <a:avLst/>
@@ -116,7 +118,7 @@
       </p:sp>
       <p:sp>
         <p:nvSpPr>
-          <p:cNvPr id="28" name="PlaceHolder 3"/>
+          <p:cNvPr id="25" name="PlaceHolder 3"/>
           <p:cNvSpPr>
             <a:spLocks noGrp="1"/>
           </p:cNvSpPr>
@@ -126,8 +128,8 @@
         </p:nvSpPr>
         <p:spPr>
           <a:xfrm>
-            <a:off x="838080" y="4098240"/>
-            <a:ext cx="10515240" cy="2075040"/>
+            <a:off x="609480" y="3682080"/>
+            <a:ext cx="10972440" cy="1896840"/>
           </a:xfrm>
           <a:prstGeom prst="rect">
             <a:avLst/>
@@ -164,7 +166,7 @@
       </p:grpSpPr>
       <p:sp>
         <p:nvSpPr>
-          <p:cNvPr id="29" name="PlaceHolder 1"/>
+          <p:cNvPr id="26" name="PlaceHolder 1"/>
           <p:cNvSpPr>
             <a:spLocks noGrp="1"/>
           </p:cNvSpPr>
@@ -174,8 +176,8 @@
         </p:nvSpPr>
         <p:spPr>
           <a:xfrm>
-            <a:off x="838080" y="365040"/>
-            <a:ext cx="10515240" cy="1325520"/>
+            <a:off x="609480" y="273600"/>
+            <a:ext cx="10972440" cy="1144800"/>
           </a:xfrm>
           <a:prstGeom prst="rect">
             <a:avLst/>
@@ -184,13 +186,14 @@
         <p:txBody>
           <a:bodyPr lIns="0" rIns="0" tIns="0" bIns="0" anchor="ctr"/>
           <a:p>
-            <a:endParaRPr/>
-          </a:p>
-        </p:txBody>
-      </p:sp>
-      <p:sp>
-        <p:nvSpPr>
-          <p:cNvPr id="30" name="PlaceHolder 2"/>
+            <a:pPr algn="ctr"/>
+            <a:endParaRPr/>
+          </a:p>
+        </p:txBody>
+      </p:sp>
+      <p:sp>
+        <p:nvSpPr>
+          <p:cNvPr id="27" name="PlaceHolder 2"/>
           <p:cNvSpPr>
             <a:spLocks noGrp="1"/>
           </p:cNvSpPr>
@@ -200,8 +203,8 @@
         </p:nvSpPr>
         <p:spPr>
           <a:xfrm>
-            <a:off x="838080" y="1825560"/>
-            <a:ext cx="5131080" cy="2075040"/>
+            <a:off x="609480" y="1604520"/>
+            <a:ext cx="5354280" cy="1896840"/>
           </a:xfrm>
           <a:prstGeom prst="rect">
             <a:avLst/>
@@ -216,7 +219,7 @@
       </p:sp>
       <p:sp>
         <p:nvSpPr>
-          <p:cNvPr id="31" name="PlaceHolder 3"/>
+          <p:cNvPr id="28" name="PlaceHolder 3"/>
           <p:cNvSpPr>
             <a:spLocks noGrp="1"/>
           </p:cNvSpPr>
@@ -226,8 +229,8 @@
         </p:nvSpPr>
         <p:spPr>
           <a:xfrm>
-            <a:off x="6226200" y="1825560"/>
-            <a:ext cx="5131080" cy="2075040"/>
+            <a:off x="6231960" y="1604520"/>
+            <a:ext cx="5354280" cy="1896840"/>
           </a:xfrm>
           <a:prstGeom prst="rect">
             <a:avLst/>
@@ -242,7 +245,7 @@
       </p:sp>
       <p:sp>
         <p:nvSpPr>
-          <p:cNvPr id="32" name="PlaceHolder 4"/>
+          <p:cNvPr id="29" name="PlaceHolder 4"/>
           <p:cNvSpPr>
             <a:spLocks noGrp="1"/>
           </p:cNvSpPr>
@@ -252,8 +255,8 @@
         </p:nvSpPr>
         <p:spPr>
           <a:xfrm>
-            <a:off x="6226200" y="4098240"/>
-            <a:ext cx="5131080" cy="2075040"/>
+            <a:off x="6231960" y="3682080"/>
+            <a:ext cx="5354280" cy="1896840"/>
           </a:xfrm>
           <a:prstGeom prst="rect">
             <a:avLst/>
@@ -268,7 +271,7 @@
       </p:sp>
       <p:sp>
         <p:nvSpPr>
-          <p:cNvPr id="33" name="PlaceHolder 5"/>
+          <p:cNvPr id="30" name="PlaceHolder 5"/>
           <p:cNvSpPr>
             <a:spLocks noGrp="1"/>
           </p:cNvSpPr>
@@ -278,8 +281,8 @@
         </p:nvSpPr>
         <p:spPr>
           <a:xfrm>
-            <a:off x="838080" y="4098240"/>
-            <a:ext cx="5131080" cy="2075040"/>
+            <a:off x="609480" y="3682080"/>
+            <a:ext cx="5354280" cy="1896840"/>
           </a:xfrm>
           <a:prstGeom prst="rect">
             <a:avLst/>
@@ -316,7 +319,7 @@
       </p:grpSpPr>
       <p:sp>
         <p:nvSpPr>
-          <p:cNvPr id="34" name="PlaceHolder 1"/>
+          <p:cNvPr id="31" name="PlaceHolder 1"/>
           <p:cNvSpPr>
             <a:spLocks noGrp="1"/>
           </p:cNvSpPr>
@@ -326,8 +329,8 @@
         </p:nvSpPr>
         <p:spPr>
           <a:xfrm>
-            <a:off x="838080" y="365040"/>
-            <a:ext cx="10515240" cy="1325520"/>
+            <a:off x="609480" y="273600"/>
+            <a:ext cx="10972440" cy="1144800"/>
           </a:xfrm>
           <a:prstGeom prst="rect">
             <a:avLst/>
@@ -336,13 +339,14 @@
         <p:txBody>
           <a:bodyPr lIns="0" rIns="0" tIns="0" bIns="0" anchor="ctr"/>
           <a:p>
-            <a:endParaRPr/>
-          </a:p>
-        </p:txBody>
-      </p:sp>
-      <p:sp>
-        <p:nvSpPr>
-          <p:cNvPr id="35" name="PlaceHolder 2"/>
+            <a:pPr algn="ctr"/>
+            <a:endParaRPr/>
+          </a:p>
+        </p:txBody>
+      </p:sp>
+      <p:sp>
+        <p:nvSpPr>
+          <p:cNvPr id="32" name="PlaceHolder 2"/>
           <p:cNvSpPr>
             <a:spLocks noGrp="1"/>
           </p:cNvSpPr>
@@ -352,8 +356,8 @@
         </p:nvSpPr>
         <p:spPr>
           <a:xfrm>
-            <a:off x="838080" y="1825560"/>
-            <a:ext cx="10515240" cy="4350960"/>
+            <a:off x="609480" y="1604520"/>
+            <a:ext cx="10972440" cy="3977280"/>
           </a:xfrm>
           <a:prstGeom prst="rect">
             <a:avLst/>
@@ -368,7 +372,7 @@
       </p:sp>
       <p:sp>
         <p:nvSpPr>
-          <p:cNvPr id="36" name="PlaceHolder 3"/>
+          <p:cNvPr id="33" name="PlaceHolder 3"/>
           <p:cNvSpPr>
             <a:spLocks noGrp="1"/>
           </p:cNvSpPr>
@@ -378,8 +382,8 @@
         </p:nvSpPr>
         <p:spPr>
           <a:xfrm>
-            <a:off x="838080" y="1825560"/>
-            <a:ext cx="10515240" cy="4350960"/>
+            <a:off x="609480" y="1604520"/>
+            <a:ext cx="10972440" cy="3977280"/>
           </a:xfrm>
           <a:prstGeom prst="rect">
             <a:avLst/>
@@ -394,20 +398,18 @@
       </p:sp>
       <p:pic>
         <p:nvPicPr>
-          <p:cNvPr id="37" name="" descr=""/>
+          <p:cNvPr id="34" name="" descr=""/>
           <p:cNvPicPr/>
           <p:nvPr/>
         </p:nvPicPr>
         <p:blipFill>
           <a:blip r:embed="rId2"/>
-          <a:stretch>
-            <a:fillRect/>
-          </a:stretch>
+          <a:stretch/>
         </p:blipFill>
         <p:spPr>
           <a:xfrm>
-            <a:off x="3368880" y="1825560"/>
-            <a:ext cx="5452920" cy="4350960"/>
+            <a:off x="3602880" y="1604520"/>
+            <a:ext cx="4984920" cy="3977280"/>
           </a:xfrm>
           <a:prstGeom prst="rect">
             <a:avLst/>
@@ -419,20 +421,18 @@
       </p:pic>
       <p:pic>
         <p:nvPicPr>
-          <p:cNvPr id="38" name="" descr=""/>
+          <p:cNvPr id="35" name="" descr=""/>
           <p:cNvPicPr/>
           <p:nvPr/>
         </p:nvPicPr>
         <p:blipFill>
           <a:blip r:embed="rId3"/>
-          <a:stretch>
-            <a:fillRect/>
-          </a:stretch>
+          <a:stretch/>
         </p:blipFill>
         <p:spPr>
           <a:xfrm>
-            <a:off x="3368880" y="1825560"/>
-            <a:ext cx="5452920" cy="4350960"/>
+            <a:off x="3602880" y="1604520"/>
+            <a:ext cx="4984920" cy="3977280"/>
           </a:xfrm>
           <a:prstGeom prst="rect">
             <a:avLst/>
@@ -488,7 +488,7 @@
       </p:grpSpPr>
       <p:sp>
         <p:nvSpPr>
-          <p:cNvPr id="44" name="PlaceHolder 1"/>
+          <p:cNvPr id="38" name="PlaceHolder 1"/>
           <p:cNvSpPr>
             <a:spLocks noGrp="1"/>
           </p:cNvSpPr>
@@ -498,8 +498,8 @@
         </p:nvSpPr>
         <p:spPr>
           <a:xfrm>
-            <a:off x="838080" y="365040"/>
-            <a:ext cx="10515240" cy="1325520"/>
+            <a:off x="609480" y="273600"/>
+            <a:ext cx="10972440" cy="1144800"/>
           </a:xfrm>
           <a:prstGeom prst="rect">
             <a:avLst/>
@@ -508,13 +508,14 @@
         <p:txBody>
           <a:bodyPr lIns="0" rIns="0" tIns="0" bIns="0" anchor="ctr"/>
           <a:p>
-            <a:endParaRPr/>
-          </a:p>
-        </p:txBody>
-      </p:sp>
-      <p:sp>
-        <p:nvSpPr>
-          <p:cNvPr id="45" name="PlaceHolder 2"/>
+            <a:pPr algn="ctr"/>
+            <a:endParaRPr/>
+          </a:p>
+        </p:txBody>
+      </p:sp>
+      <p:sp>
+        <p:nvSpPr>
+          <p:cNvPr id="39" name="PlaceHolder 2"/>
           <p:cNvSpPr>
             <a:spLocks noGrp="1"/>
           </p:cNvSpPr>
@@ -524,8 +525,8 @@
         </p:nvSpPr>
         <p:spPr>
           <a:xfrm>
-            <a:off x="838080" y="1825560"/>
-            <a:ext cx="10515240" cy="4351320"/>
+            <a:off x="609480" y="1604520"/>
+            <a:ext cx="10972440" cy="3977280"/>
           </a:xfrm>
           <a:prstGeom prst="rect">
             <a:avLst/>
@@ -563,7 +564,7 @@
       </p:grpSpPr>
       <p:sp>
         <p:nvSpPr>
-          <p:cNvPr id="46" name="PlaceHolder 1"/>
+          <p:cNvPr id="40" name="PlaceHolder 1"/>
           <p:cNvSpPr>
             <a:spLocks noGrp="1"/>
           </p:cNvSpPr>
@@ -573,8 +574,8 @@
         </p:nvSpPr>
         <p:spPr>
           <a:xfrm>
-            <a:off x="838080" y="365040"/>
-            <a:ext cx="10515240" cy="1325520"/>
+            <a:off x="609480" y="273600"/>
+            <a:ext cx="10972440" cy="1144800"/>
           </a:xfrm>
           <a:prstGeom prst="rect">
             <a:avLst/>
@@ -583,13 +584,14 @@
         <p:txBody>
           <a:bodyPr lIns="0" rIns="0" tIns="0" bIns="0" anchor="ctr"/>
           <a:p>
-            <a:endParaRPr/>
-          </a:p>
-        </p:txBody>
-      </p:sp>
-      <p:sp>
-        <p:nvSpPr>
-          <p:cNvPr id="47" name="PlaceHolder 2"/>
+            <a:pPr algn="ctr"/>
+            <a:endParaRPr/>
+          </a:p>
+        </p:txBody>
+      </p:sp>
+      <p:sp>
+        <p:nvSpPr>
+          <p:cNvPr id="41" name="PlaceHolder 2"/>
           <p:cNvSpPr>
             <a:spLocks noGrp="1"/>
           </p:cNvSpPr>
@@ -599,8 +601,8 @@
         </p:nvSpPr>
         <p:spPr>
           <a:xfrm>
-            <a:off x="838080" y="1825560"/>
-            <a:ext cx="10515240" cy="4350960"/>
+            <a:off x="609480" y="1604520"/>
+            <a:ext cx="10972440" cy="3977280"/>
           </a:xfrm>
           <a:prstGeom prst="rect">
             <a:avLst/>
@@ -637,7 +639,7 @@
       </p:grpSpPr>
       <p:sp>
         <p:nvSpPr>
-          <p:cNvPr id="48" name="PlaceHolder 1"/>
+          <p:cNvPr id="42" name="PlaceHolder 1"/>
           <p:cNvSpPr>
             <a:spLocks noGrp="1"/>
           </p:cNvSpPr>
@@ -647,8 +649,8 @@
         </p:nvSpPr>
         <p:spPr>
           <a:xfrm>
-            <a:off x="838080" y="365040"/>
-            <a:ext cx="10515240" cy="1325520"/>
+            <a:off x="609480" y="273600"/>
+            <a:ext cx="10972440" cy="1144800"/>
           </a:xfrm>
           <a:prstGeom prst="rect">
             <a:avLst/>
@@ -657,13 +659,14 @@
         <p:txBody>
           <a:bodyPr lIns="0" rIns="0" tIns="0" bIns="0" anchor="ctr"/>
           <a:p>
-            <a:endParaRPr/>
-          </a:p>
-        </p:txBody>
-      </p:sp>
-      <p:sp>
-        <p:nvSpPr>
-          <p:cNvPr id="49" name="PlaceHolder 2"/>
+            <a:pPr algn="ctr"/>
+            <a:endParaRPr/>
+          </a:p>
+        </p:txBody>
+      </p:sp>
+      <p:sp>
+        <p:nvSpPr>
+          <p:cNvPr id="43" name="PlaceHolder 2"/>
           <p:cNvSpPr>
             <a:spLocks noGrp="1"/>
           </p:cNvSpPr>
@@ -673,8 +676,8 @@
         </p:nvSpPr>
         <p:spPr>
           <a:xfrm>
-            <a:off x="838080" y="1825560"/>
-            <a:ext cx="5131080" cy="4350960"/>
+            <a:off x="609480" y="1604520"/>
+            <a:ext cx="5354280" cy="3977280"/>
           </a:xfrm>
           <a:prstGeom prst="rect">
             <a:avLst/>
@@ -689,7 +692,7 @@
       </p:sp>
       <p:sp>
         <p:nvSpPr>
-          <p:cNvPr id="50" name="PlaceHolder 3"/>
+          <p:cNvPr id="44" name="PlaceHolder 3"/>
           <p:cNvSpPr>
             <a:spLocks noGrp="1"/>
           </p:cNvSpPr>
@@ -699,8 +702,8 @@
         </p:nvSpPr>
         <p:spPr>
           <a:xfrm>
-            <a:off x="6226200" y="1825560"/>
-            <a:ext cx="5131080" cy="4350960"/>
+            <a:off x="6231960" y="1604520"/>
+            <a:ext cx="5354280" cy="3977280"/>
           </a:xfrm>
           <a:prstGeom prst="rect">
             <a:avLst/>
@@ -737,7 +740,7 @@
       </p:grpSpPr>
       <p:sp>
         <p:nvSpPr>
-          <p:cNvPr id="51" name="PlaceHolder 1"/>
+          <p:cNvPr id="45" name="PlaceHolder 1"/>
           <p:cNvSpPr>
             <a:spLocks noGrp="1"/>
           </p:cNvSpPr>
@@ -747,8 +750,8 @@
         </p:nvSpPr>
         <p:spPr>
           <a:xfrm>
-            <a:off x="838080" y="365040"/>
-            <a:ext cx="10515240" cy="1325520"/>
+            <a:off x="609480" y="273600"/>
+            <a:ext cx="10972440" cy="1144800"/>
           </a:xfrm>
           <a:prstGeom prst="rect">
             <a:avLst/>
@@ -757,6 +760,7 @@
         <p:txBody>
           <a:bodyPr lIns="0" rIns="0" tIns="0" bIns="0" anchor="ctr"/>
           <a:p>
+            <a:pPr algn="ctr"/>
             <a:endParaRPr/>
           </a:p>
         </p:txBody>
@@ -785,7 +789,7 @@
       </p:grpSpPr>
       <p:sp>
         <p:nvSpPr>
-          <p:cNvPr id="52" name="PlaceHolder 1"/>
+          <p:cNvPr id="46" name="PlaceHolder 1"/>
           <p:cNvSpPr>
             <a:spLocks noGrp="1"/>
           </p:cNvSpPr>
@@ -795,8 +799,8 @@
         </p:nvSpPr>
         <p:spPr>
           <a:xfrm>
-            <a:off x="838080" y="365040"/>
-            <a:ext cx="10515240" cy="6144480"/>
+            <a:off x="609480" y="273600"/>
+            <a:ext cx="10972440" cy="5307840"/>
           </a:xfrm>
           <a:prstGeom prst="rect">
             <a:avLst/>
@@ -834,7 +838,7 @@
       </p:grpSpPr>
       <p:sp>
         <p:nvSpPr>
-          <p:cNvPr id="53" name="PlaceHolder 1"/>
+          <p:cNvPr id="47" name="PlaceHolder 1"/>
           <p:cNvSpPr>
             <a:spLocks noGrp="1"/>
           </p:cNvSpPr>
@@ -844,8 +848,8 @@
         </p:nvSpPr>
         <p:spPr>
           <a:xfrm>
-            <a:off x="838080" y="365040"/>
-            <a:ext cx="10515240" cy="1325520"/>
+            <a:off x="609480" y="273600"/>
+            <a:ext cx="10972440" cy="1144800"/>
           </a:xfrm>
           <a:prstGeom prst="rect">
             <a:avLst/>
@@ -854,13 +858,14 @@
         <p:txBody>
           <a:bodyPr lIns="0" rIns="0" tIns="0" bIns="0" anchor="ctr"/>
           <a:p>
-            <a:endParaRPr/>
-          </a:p>
-        </p:txBody>
-      </p:sp>
-      <p:sp>
-        <p:nvSpPr>
-          <p:cNvPr id="54" name="PlaceHolder 2"/>
+            <a:pPr algn="ctr"/>
+            <a:endParaRPr/>
+          </a:p>
+        </p:txBody>
+      </p:sp>
+      <p:sp>
+        <p:nvSpPr>
+          <p:cNvPr id="48" name="PlaceHolder 2"/>
           <p:cNvSpPr>
             <a:spLocks noGrp="1"/>
           </p:cNvSpPr>
@@ -870,8 +875,8 @@
         </p:nvSpPr>
         <p:spPr>
           <a:xfrm>
-            <a:off x="838080" y="1825560"/>
-            <a:ext cx="5131080" cy="2075040"/>
+            <a:off x="609480" y="1604520"/>
+            <a:ext cx="5354280" cy="1896840"/>
           </a:xfrm>
           <a:prstGeom prst="rect">
             <a:avLst/>
@@ -886,7 +891,7 @@
       </p:sp>
       <p:sp>
         <p:nvSpPr>
-          <p:cNvPr id="55" name="PlaceHolder 3"/>
+          <p:cNvPr id="49" name="PlaceHolder 3"/>
           <p:cNvSpPr>
             <a:spLocks noGrp="1"/>
           </p:cNvSpPr>
@@ -896,8 +901,8 @@
         </p:nvSpPr>
         <p:spPr>
           <a:xfrm>
-            <a:off x="838080" y="4098240"/>
-            <a:ext cx="5131080" cy="2075040"/>
+            <a:off x="609480" y="3682080"/>
+            <a:ext cx="5354280" cy="1896840"/>
           </a:xfrm>
           <a:prstGeom prst="rect">
             <a:avLst/>
@@ -912,7 +917,7 @@
       </p:sp>
       <p:sp>
         <p:nvSpPr>
-          <p:cNvPr id="56" name="PlaceHolder 4"/>
+          <p:cNvPr id="50" name="PlaceHolder 4"/>
           <p:cNvSpPr>
             <a:spLocks noGrp="1"/>
           </p:cNvSpPr>
@@ -922,8 +927,8 @@
         </p:nvSpPr>
         <p:spPr>
           <a:xfrm>
-            <a:off x="6226200" y="1825560"/>
-            <a:ext cx="5131080" cy="4350960"/>
+            <a:off x="6231960" y="1604520"/>
+            <a:ext cx="5354280" cy="3977280"/>
           </a:xfrm>
           <a:prstGeom prst="rect">
             <a:avLst/>
@@ -960,7 +965,7 @@
       </p:grpSpPr>
       <p:sp>
         <p:nvSpPr>
-          <p:cNvPr id="5" name="PlaceHolder 1"/>
+          <p:cNvPr id="2" name="PlaceHolder 1"/>
           <p:cNvSpPr>
             <a:spLocks noGrp="1"/>
           </p:cNvSpPr>
@@ -970,8 +975,8 @@
         </p:nvSpPr>
         <p:spPr>
           <a:xfrm>
-            <a:off x="838080" y="365040"/>
-            <a:ext cx="10515240" cy="1325520"/>
+            <a:off x="609480" y="273600"/>
+            <a:ext cx="10972440" cy="1144800"/>
           </a:xfrm>
           <a:prstGeom prst="rect">
             <a:avLst/>
@@ -980,13 +985,14 @@
         <p:txBody>
           <a:bodyPr lIns="0" rIns="0" tIns="0" bIns="0" anchor="ctr"/>
           <a:p>
-            <a:endParaRPr/>
-          </a:p>
-        </p:txBody>
-      </p:sp>
-      <p:sp>
-        <p:nvSpPr>
-          <p:cNvPr id="6" name="PlaceHolder 2"/>
+            <a:pPr algn="ctr"/>
+            <a:endParaRPr/>
+          </a:p>
+        </p:txBody>
+      </p:sp>
+      <p:sp>
+        <p:nvSpPr>
+          <p:cNvPr id="3" name="PlaceHolder 2"/>
           <p:cNvSpPr>
             <a:spLocks noGrp="1"/>
           </p:cNvSpPr>
@@ -996,8 +1002,8 @@
         </p:nvSpPr>
         <p:spPr>
           <a:xfrm>
-            <a:off x="838080" y="1825560"/>
-            <a:ext cx="10515240" cy="4351320"/>
+            <a:off x="609480" y="1604520"/>
+            <a:ext cx="10972440" cy="3977280"/>
           </a:xfrm>
           <a:prstGeom prst="rect">
             <a:avLst/>
@@ -1035,7 +1041,7 @@
       </p:grpSpPr>
       <p:sp>
         <p:nvSpPr>
-          <p:cNvPr id="57" name="PlaceHolder 1"/>
+          <p:cNvPr id="51" name="PlaceHolder 1"/>
           <p:cNvSpPr>
             <a:spLocks noGrp="1"/>
           </p:cNvSpPr>
@@ -1045,8 +1051,8 @@
         </p:nvSpPr>
         <p:spPr>
           <a:xfrm>
-            <a:off x="838080" y="365040"/>
-            <a:ext cx="10515240" cy="1325520"/>
+            <a:off x="609480" y="273600"/>
+            <a:ext cx="10972440" cy="1144800"/>
           </a:xfrm>
           <a:prstGeom prst="rect">
             <a:avLst/>
@@ -1055,13 +1061,14 @@
         <p:txBody>
           <a:bodyPr lIns="0" rIns="0" tIns="0" bIns="0" anchor="ctr"/>
           <a:p>
-            <a:endParaRPr/>
-          </a:p>
-        </p:txBody>
-      </p:sp>
-      <p:sp>
-        <p:nvSpPr>
-          <p:cNvPr id="58" name="PlaceHolder 2"/>
+            <a:pPr algn="ctr"/>
+            <a:endParaRPr/>
+          </a:p>
+        </p:txBody>
+      </p:sp>
+      <p:sp>
+        <p:nvSpPr>
+          <p:cNvPr id="52" name="PlaceHolder 2"/>
           <p:cNvSpPr>
             <a:spLocks noGrp="1"/>
           </p:cNvSpPr>
@@ -1071,8 +1078,8 @@
         </p:nvSpPr>
         <p:spPr>
           <a:xfrm>
-            <a:off x="838080" y="1825560"/>
-            <a:ext cx="5131080" cy="4350960"/>
+            <a:off x="609480" y="1604520"/>
+            <a:ext cx="5354280" cy="3977280"/>
           </a:xfrm>
           <a:prstGeom prst="rect">
             <a:avLst/>
@@ -1087,7 +1094,7 @@
       </p:sp>
       <p:sp>
         <p:nvSpPr>
-          <p:cNvPr id="59" name="PlaceHolder 3"/>
+          <p:cNvPr id="53" name="PlaceHolder 3"/>
           <p:cNvSpPr>
             <a:spLocks noGrp="1"/>
           </p:cNvSpPr>
@@ -1097,8 +1104,8 @@
         </p:nvSpPr>
         <p:spPr>
           <a:xfrm>
-            <a:off x="6226200" y="1825560"/>
-            <a:ext cx="5131080" cy="2075040"/>
+            <a:off x="6231960" y="1604520"/>
+            <a:ext cx="5354280" cy="1896840"/>
           </a:xfrm>
           <a:prstGeom prst="rect">
             <a:avLst/>
@@ -1113,7 +1120,7 @@
       </p:sp>
       <p:sp>
         <p:nvSpPr>
-          <p:cNvPr id="60" name="PlaceHolder 4"/>
+          <p:cNvPr id="54" name="PlaceHolder 4"/>
           <p:cNvSpPr>
             <a:spLocks noGrp="1"/>
           </p:cNvSpPr>
@@ -1123,8 +1130,8 @@
         </p:nvSpPr>
         <p:spPr>
           <a:xfrm>
-            <a:off x="6226200" y="4098240"/>
-            <a:ext cx="5131080" cy="2075040"/>
+            <a:off x="6231960" y="3682080"/>
+            <a:ext cx="5354280" cy="1896840"/>
           </a:xfrm>
           <a:prstGeom prst="rect">
             <a:avLst/>
@@ -1161,7 +1168,7 @@
       </p:grpSpPr>
       <p:sp>
         <p:nvSpPr>
-          <p:cNvPr id="61" name="PlaceHolder 1"/>
+          <p:cNvPr id="55" name="PlaceHolder 1"/>
           <p:cNvSpPr>
             <a:spLocks noGrp="1"/>
           </p:cNvSpPr>
@@ -1171,8 +1178,8 @@
         </p:nvSpPr>
         <p:spPr>
           <a:xfrm>
-            <a:off x="838080" y="365040"/>
-            <a:ext cx="10515240" cy="1325520"/>
+            <a:off x="609480" y="273600"/>
+            <a:ext cx="10972440" cy="1144800"/>
           </a:xfrm>
           <a:prstGeom prst="rect">
             <a:avLst/>
@@ -1181,13 +1188,14 @@
         <p:txBody>
           <a:bodyPr lIns="0" rIns="0" tIns="0" bIns="0" anchor="ctr"/>
           <a:p>
-            <a:endParaRPr/>
-          </a:p>
-        </p:txBody>
-      </p:sp>
-      <p:sp>
-        <p:nvSpPr>
-          <p:cNvPr id="62" name="PlaceHolder 2"/>
+            <a:pPr algn="ctr"/>
+            <a:endParaRPr/>
+          </a:p>
+        </p:txBody>
+      </p:sp>
+      <p:sp>
+        <p:nvSpPr>
+          <p:cNvPr id="56" name="PlaceHolder 2"/>
           <p:cNvSpPr>
             <a:spLocks noGrp="1"/>
           </p:cNvSpPr>
@@ -1197,8 +1205,8 @@
         </p:nvSpPr>
         <p:spPr>
           <a:xfrm>
-            <a:off x="838080" y="1825560"/>
-            <a:ext cx="5131080" cy="2075040"/>
+            <a:off x="609480" y="1604520"/>
+            <a:ext cx="5354280" cy="1896840"/>
           </a:xfrm>
           <a:prstGeom prst="rect">
             <a:avLst/>
@@ -1213,7 +1221,7 @@
       </p:sp>
       <p:sp>
         <p:nvSpPr>
-          <p:cNvPr id="63" name="PlaceHolder 3"/>
+          <p:cNvPr id="57" name="PlaceHolder 3"/>
           <p:cNvSpPr>
             <a:spLocks noGrp="1"/>
           </p:cNvSpPr>
@@ -1223,8 +1231,8 @@
         </p:nvSpPr>
         <p:spPr>
           <a:xfrm>
-            <a:off x="6226200" y="1825560"/>
-            <a:ext cx="5131080" cy="2075040"/>
+            <a:off x="6231960" y="1604520"/>
+            <a:ext cx="5354280" cy="1896840"/>
           </a:xfrm>
           <a:prstGeom prst="rect">
             <a:avLst/>
@@ -1239,7 +1247,7 @@
       </p:sp>
       <p:sp>
         <p:nvSpPr>
-          <p:cNvPr id="64" name="PlaceHolder 4"/>
+          <p:cNvPr id="58" name="PlaceHolder 4"/>
           <p:cNvSpPr>
             <a:spLocks noGrp="1"/>
           </p:cNvSpPr>
@@ -1249,8 +1257,8 @@
         </p:nvSpPr>
         <p:spPr>
           <a:xfrm>
-            <a:off x="838080" y="4098240"/>
-            <a:ext cx="10515240" cy="2075040"/>
+            <a:off x="609480" y="3682080"/>
+            <a:ext cx="10972440" cy="1896840"/>
           </a:xfrm>
           <a:prstGeom prst="rect">
             <a:avLst/>
@@ -1287,7 +1295,7 @@
       </p:grpSpPr>
       <p:sp>
         <p:nvSpPr>
-          <p:cNvPr id="65" name="PlaceHolder 1"/>
+          <p:cNvPr id="59" name="PlaceHolder 1"/>
           <p:cNvSpPr>
             <a:spLocks noGrp="1"/>
           </p:cNvSpPr>
@@ -1297,8 +1305,8 @@
         </p:nvSpPr>
         <p:spPr>
           <a:xfrm>
-            <a:off x="838080" y="365040"/>
-            <a:ext cx="10515240" cy="1325520"/>
+            <a:off x="609480" y="273600"/>
+            <a:ext cx="10972440" cy="1144800"/>
           </a:xfrm>
           <a:prstGeom prst="rect">
             <a:avLst/>
@@ -1307,13 +1315,14 @@
         <p:txBody>
           <a:bodyPr lIns="0" rIns="0" tIns="0" bIns="0" anchor="ctr"/>
           <a:p>
-            <a:endParaRPr/>
-          </a:p>
-        </p:txBody>
-      </p:sp>
-      <p:sp>
-        <p:nvSpPr>
-          <p:cNvPr id="66" name="PlaceHolder 2"/>
+            <a:pPr algn="ctr"/>
+            <a:endParaRPr/>
+          </a:p>
+        </p:txBody>
+      </p:sp>
+      <p:sp>
+        <p:nvSpPr>
+          <p:cNvPr id="60" name="PlaceHolder 2"/>
           <p:cNvSpPr>
             <a:spLocks noGrp="1"/>
           </p:cNvSpPr>
@@ -1323,8 +1332,8 @@
         </p:nvSpPr>
         <p:spPr>
           <a:xfrm>
-            <a:off x="838080" y="1825560"/>
-            <a:ext cx="10515240" cy="2075040"/>
+            <a:off x="609480" y="1604520"/>
+            <a:ext cx="10972440" cy="1896840"/>
           </a:xfrm>
           <a:prstGeom prst="rect">
             <a:avLst/>
@@ -1339,7 +1348,7 @@
       </p:sp>
       <p:sp>
         <p:nvSpPr>
-          <p:cNvPr id="67" name="PlaceHolder 3"/>
+          <p:cNvPr id="61" name="PlaceHolder 3"/>
           <p:cNvSpPr>
             <a:spLocks noGrp="1"/>
           </p:cNvSpPr>
@@ -1349,8 +1358,8 @@
         </p:nvSpPr>
         <p:spPr>
           <a:xfrm>
-            <a:off x="838080" y="4098240"/>
-            <a:ext cx="10515240" cy="2075040"/>
+            <a:off x="609480" y="3682080"/>
+            <a:ext cx="10972440" cy="1896840"/>
           </a:xfrm>
           <a:prstGeom prst="rect">
             <a:avLst/>
@@ -1387,7 +1396,7 @@
       </p:grpSpPr>
       <p:sp>
         <p:nvSpPr>
-          <p:cNvPr id="68" name="PlaceHolder 1"/>
+          <p:cNvPr id="62" name="PlaceHolder 1"/>
           <p:cNvSpPr>
             <a:spLocks noGrp="1"/>
           </p:cNvSpPr>
@@ -1397,8 +1406,8 @@
         </p:nvSpPr>
         <p:spPr>
           <a:xfrm>
-            <a:off x="838080" y="365040"/>
-            <a:ext cx="10515240" cy="1325520"/>
+            <a:off x="609480" y="273600"/>
+            <a:ext cx="10972440" cy="1144800"/>
           </a:xfrm>
           <a:prstGeom prst="rect">
             <a:avLst/>
@@ -1407,13 +1416,14 @@
         <p:txBody>
           <a:bodyPr lIns="0" rIns="0" tIns="0" bIns="0" anchor="ctr"/>
           <a:p>
-            <a:endParaRPr/>
-          </a:p>
-        </p:txBody>
-      </p:sp>
-      <p:sp>
-        <p:nvSpPr>
-          <p:cNvPr id="69" name="PlaceHolder 2"/>
+            <a:pPr algn="ctr"/>
+            <a:endParaRPr/>
+          </a:p>
+        </p:txBody>
+      </p:sp>
+      <p:sp>
+        <p:nvSpPr>
+          <p:cNvPr id="63" name="PlaceHolder 2"/>
           <p:cNvSpPr>
             <a:spLocks noGrp="1"/>
           </p:cNvSpPr>
@@ -1423,8 +1433,8 @@
         </p:nvSpPr>
         <p:spPr>
           <a:xfrm>
-            <a:off x="838080" y="1825560"/>
-            <a:ext cx="5131080" cy="2075040"/>
+            <a:off x="609480" y="1604520"/>
+            <a:ext cx="5354280" cy="1896840"/>
           </a:xfrm>
           <a:prstGeom prst="rect">
             <a:avLst/>
@@ -1439,7 +1449,7 @@
       </p:sp>
       <p:sp>
         <p:nvSpPr>
-          <p:cNvPr id="70" name="PlaceHolder 3"/>
+          <p:cNvPr id="64" name="PlaceHolder 3"/>
           <p:cNvSpPr>
             <a:spLocks noGrp="1"/>
           </p:cNvSpPr>
@@ -1449,8 +1459,8 @@
         </p:nvSpPr>
         <p:spPr>
           <a:xfrm>
-            <a:off x="6226200" y="1825560"/>
-            <a:ext cx="5131080" cy="2075040"/>
+            <a:off x="6231960" y="1604520"/>
+            <a:ext cx="5354280" cy="1896840"/>
           </a:xfrm>
           <a:prstGeom prst="rect">
             <a:avLst/>
@@ -1465,7 +1475,7 @@
       </p:sp>
       <p:sp>
         <p:nvSpPr>
-          <p:cNvPr id="71" name="PlaceHolder 4"/>
+          <p:cNvPr id="65" name="PlaceHolder 4"/>
           <p:cNvSpPr>
             <a:spLocks noGrp="1"/>
           </p:cNvSpPr>
@@ -1475,8 +1485,8 @@
         </p:nvSpPr>
         <p:spPr>
           <a:xfrm>
-            <a:off x="6226200" y="4098240"/>
-            <a:ext cx="5131080" cy="2075040"/>
+            <a:off x="6231960" y="3682080"/>
+            <a:ext cx="5354280" cy="1896840"/>
           </a:xfrm>
           <a:prstGeom prst="rect">
             <a:avLst/>
@@ -1491,7 +1501,7 @@
       </p:sp>
       <p:sp>
         <p:nvSpPr>
-          <p:cNvPr id="72" name="PlaceHolder 5"/>
+          <p:cNvPr id="66" name="PlaceHolder 5"/>
           <p:cNvSpPr>
             <a:spLocks noGrp="1"/>
           </p:cNvSpPr>
@@ -1501,8 +1511,8 @@
         </p:nvSpPr>
         <p:spPr>
           <a:xfrm>
-            <a:off x="838080" y="4098240"/>
-            <a:ext cx="5131080" cy="2075040"/>
+            <a:off x="609480" y="3682080"/>
+            <a:ext cx="5354280" cy="1896840"/>
           </a:xfrm>
           <a:prstGeom prst="rect">
             <a:avLst/>
@@ -1539,7 +1549,7 @@
       </p:grpSpPr>
       <p:sp>
         <p:nvSpPr>
-          <p:cNvPr id="73" name="PlaceHolder 1"/>
+          <p:cNvPr id="67" name="PlaceHolder 1"/>
           <p:cNvSpPr>
             <a:spLocks noGrp="1"/>
           </p:cNvSpPr>
@@ -1549,8 +1559,8 @@
         </p:nvSpPr>
         <p:spPr>
           <a:xfrm>
-            <a:off x="838080" y="365040"/>
-            <a:ext cx="10515240" cy="1325520"/>
+            <a:off x="609480" y="273600"/>
+            <a:ext cx="10972440" cy="1144800"/>
           </a:xfrm>
           <a:prstGeom prst="rect">
             <a:avLst/>
@@ -1559,13 +1569,14 @@
         <p:txBody>
           <a:bodyPr lIns="0" rIns="0" tIns="0" bIns="0" anchor="ctr"/>
           <a:p>
-            <a:endParaRPr/>
-          </a:p>
-        </p:txBody>
-      </p:sp>
-      <p:sp>
-        <p:nvSpPr>
-          <p:cNvPr id="74" name="PlaceHolder 2"/>
+            <a:pPr algn="ctr"/>
+            <a:endParaRPr/>
+          </a:p>
+        </p:txBody>
+      </p:sp>
+      <p:sp>
+        <p:nvSpPr>
+          <p:cNvPr id="68" name="PlaceHolder 2"/>
           <p:cNvSpPr>
             <a:spLocks noGrp="1"/>
           </p:cNvSpPr>
@@ -1575,8 +1586,8 @@
         </p:nvSpPr>
         <p:spPr>
           <a:xfrm>
-            <a:off x="838080" y="1825560"/>
-            <a:ext cx="10515240" cy="4350960"/>
+            <a:off x="609480" y="1604520"/>
+            <a:ext cx="10972440" cy="3977280"/>
           </a:xfrm>
           <a:prstGeom prst="rect">
             <a:avLst/>
@@ -1591,7 +1602,7 @@
       </p:sp>
       <p:sp>
         <p:nvSpPr>
-          <p:cNvPr id="75" name="PlaceHolder 3"/>
+          <p:cNvPr id="69" name="PlaceHolder 3"/>
           <p:cNvSpPr>
             <a:spLocks noGrp="1"/>
           </p:cNvSpPr>
@@ -1601,8 +1612,8 @@
         </p:nvSpPr>
         <p:spPr>
           <a:xfrm>
-            <a:off x="838080" y="1825560"/>
-            <a:ext cx="10515240" cy="4350960"/>
+            <a:off x="609480" y="1604520"/>
+            <a:ext cx="10972440" cy="3977280"/>
           </a:xfrm>
           <a:prstGeom prst="rect">
             <a:avLst/>
@@ -1617,20 +1628,18 @@
       </p:sp>
       <p:pic>
         <p:nvPicPr>
-          <p:cNvPr id="76" name="" descr=""/>
+          <p:cNvPr id="70" name="" descr=""/>
           <p:cNvPicPr/>
           <p:nvPr/>
         </p:nvPicPr>
         <p:blipFill>
           <a:blip r:embed="rId2"/>
-          <a:stretch>
-            <a:fillRect/>
-          </a:stretch>
+          <a:stretch/>
         </p:blipFill>
         <p:spPr>
           <a:xfrm>
-            <a:off x="3368880" y="1825560"/>
-            <a:ext cx="5452920" cy="4350960"/>
+            <a:off x="3602880" y="1604520"/>
+            <a:ext cx="4984920" cy="3977280"/>
           </a:xfrm>
           <a:prstGeom prst="rect">
             <a:avLst/>
@@ -1642,20 +1651,18 @@
       </p:pic>
       <p:pic>
         <p:nvPicPr>
-          <p:cNvPr id="77" name="" descr=""/>
+          <p:cNvPr id="71" name="" descr=""/>
           <p:cNvPicPr/>
           <p:nvPr/>
         </p:nvPicPr>
         <p:blipFill>
           <a:blip r:embed="rId3"/>
-          <a:stretch>
-            <a:fillRect/>
-          </a:stretch>
+          <a:stretch/>
         </p:blipFill>
         <p:spPr>
           <a:xfrm>
-            <a:off x="3368880" y="1825560"/>
-            <a:ext cx="5452920" cy="4350960"/>
+            <a:off x="3602880" y="1604520"/>
+            <a:ext cx="4984920" cy="3977280"/>
           </a:xfrm>
           <a:prstGeom prst="rect">
             <a:avLst/>
@@ -1689,7 +1696,7 @@
       </p:grpSpPr>
       <p:sp>
         <p:nvSpPr>
-          <p:cNvPr id="7" name="PlaceHolder 1"/>
+          <p:cNvPr id="4" name="PlaceHolder 1"/>
           <p:cNvSpPr>
             <a:spLocks noGrp="1"/>
           </p:cNvSpPr>
@@ -1699,8 +1706,8 @@
         </p:nvSpPr>
         <p:spPr>
           <a:xfrm>
-            <a:off x="838080" y="365040"/>
-            <a:ext cx="10515240" cy="1325520"/>
+            <a:off x="609480" y="273600"/>
+            <a:ext cx="10972440" cy="1144800"/>
           </a:xfrm>
           <a:prstGeom prst="rect">
             <a:avLst/>
@@ -1709,13 +1716,14 @@
         <p:txBody>
           <a:bodyPr lIns="0" rIns="0" tIns="0" bIns="0" anchor="ctr"/>
           <a:p>
-            <a:endParaRPr/>
-          </a:p>
-        </p:txBody>
-      </p:sp>
-      <p:sp>
-        <p:nvSpPr>
-          <p:cNvPr id="8" name="PlaceHolder 2"/>
+            <a:pPr algn="ctr"/>
+            <a:endParaRPr/>
+          </a:p>
+        </p:txBody>
+      </p:sp>
+      <p:sp>
+        <p:nvSpPr>
+          <p:cNvPr id="5" name="PlaceHolder 2"/>
           <p:cNvSpPr>
             <a:spLocks noGrp="1"/>
           </p:cNvSpPr>
@@ -1725,8 +1733,8 @@
         </p:nvSpPr>
         <p:spPr>
           <a:xfrm>
-            <a:off x="838080" y="1825560"/>
-            <a:ext cx="10515240" cy="4350960"/>
+            <a:off x="609480" y="1604520"/>
+            <a:ext cx="10972440" cy="3977280"/>
           </a:xfrm>
           <a:prstGeom prst="rect">
             <a:avLst/>
@@ -1763,7 +1771,7 @@
       </p:grpSpPr>
       <p:sp>
         <p:nvSpPr>
-          <p:cNvPr id="9" name="PlaceHolder 1"/>
+          <p:cNvPr id="6" name="PlaceHolder 1"/>
           <p:cNvSpPr>
             <a:spLocks noGrp="1"/>
           </p:cNvSpPr>
@@ -1773,8 +1781,8 @@
         </p:nvSpPr>
         <p:spPr>
           <a:xfrm>
-            <a:off x="838080" y="365040"/>
-            <a:ext cx="10515240" cy="1325520"/>
+            <a:off x="609480" y="273600"/>
+            <a:ext cx="10972440" cy="1144800"/>
           </a:xfrm>
           <a:prstGeom prst="rect">
             <a:avLst/>
@@ -1783,13 +1791,14 @@
         <p:txBody>
           <a:bodyPr lIns="0" rIns="0" tIns="0" bIns="0" anchor="ctr"/>
           <a:p>
-            <a:endParaRPr/>
-          </a:p>
-        </p:txBody>
-      </p:sp>
-      <p:sp>
-        <p:nvSpPr>
-          <p:cNvPr id="10" name="PlaceHolder 2"/>
+            <a:pPr algn="ctr"/>
+            <a:endParaRPr/>
+          </a:p>
+        </p:txBody>
+      </p:sp>
+      <p:sp>
+        <p:nvSpPr>
+          <p:cNvPr id="7" name="PlaceHolder 2"/>
           <p:cNvSpPr>
             <a:spLocks noGrp="1"/>
           </p:cNvSpPr>
@@ -1799,8 +1808,8 @@
         </p:nvSpPr>
         <p:spPr>
           <a:xfrm>
-            <a:off x="838080" y="1825560"/>
-            <a:ext cx="5131080" cy="4350960"/>
+            <a:off x="609480" y="1604520"/>
+            <a:ext cx="5354280" cy="3977280"/>
           </a:xfrm>
           <a:prstGeom prst="rect">
             <a:avLst/>
@@ -1815,7 +1824,7 @@
       </p:sp>
       <p:sp>
         <p:nvSpPr>
-          <p:cNvPr id="11" name="PlaceHolder 3"/>
+          <p:cNvPr id="8" name="PlaceHolder 3"/>
           <p:cNvSpPr>
             <a:spLocks noGrp="1"/>
           </p:cNvSpPr>
@@ -1825,8 +1834,8 @@
         </p:nvSpPr>
         <p:spPr>
           <a:xfrm>
-            <a:off x="6226200" y="1825560"/>
-            <a:ext cx="5131080" cy="4350960"/>
+            <a:off x="6231960" y="1604520"/>
+            <a:ext cx="5354280" cy="3977280"/>
           </a:xfrm>
           <a:prstGeom prst="rect">
             <a:avLst/>
@@ -1863,7 +1872,7 @@
       </p:grpSpPr>
       <p:sp>
         <p:nvSpPr>
-          <p:cNvPr id="12" name="PlaceHolder 1"/>
+          <p:cNvPr id="9" name="PlaceHolder 1"/>
           <p:cNvSpPr>
             <a:spLocks noGrp="1"/>
           </p:cNvSpPr>
@@ -1873,8 +1882,8 @@
         </p:nvSpPr>
         <p:spPr>
           <a:xfrm>
-            <a:off x="838080" y="365040"/>
-            <a:ext cx="10515240" cy="1325520"/>
+            <a:off x="609480" y="273600"/>
+            <a:ext cx="10972440" cy="1144800"/>
           </a:xfrm>
           <a:prstGeom prst="rect">
             <a:avLst/>
@@ -1883,6 +1892,7 @@
         <p:txBody>
           <a:bodyPr lIns="0" rIns="0" tIns="0" bIns="0" anchor="ctr"/>
           <a:p>
+            <a:pPr algn="ctr"/>
             <a:endParaRPr/>
           </a:p>
         </p:txBody>
@@ -1911,7 +1921,7 @@
       </p:grpSpPr>
       <p:sp>
         <p:nvSpPr>
-          <p:cNvPr id="13" name="PlaceHolder 1"/>
+          <p:cNvPr id="10" name="PlaceHolder 1"/>
           <p:cNvSpPr>
             <a:spLocks noGrp="1"/>
           </p:cNvSpPr>
@@ -1921,8 +1931,8 @@
         </p:nvSpPr>
         <p:spPr>
           <a:xfrm>
-            <a:off x="838080" y="365040"/>
-            <a:ext cx="10515240" cy="6144480"/>
+            <a:off x="609480" y="273600"/>
+            <a:ext cx="10972440" cy="5307840"/>
           </a:xfrm>
           <a:prstGeom prst="rect">
             <a:avLst/>
@@ -1960,7 +1970,7 @@
       </p:grpSpPr>
       <p:sp>
         <p:nvSpPr>
-          <p:cNvPr id="14" name="PlaceHolder 1"/>
+          <p:cNvPr id="11" name="PlaceHolder 1"/>
           <p:cNvSpPr>
             <a:spLocks noGrp="1"/>
           </p:cNvSpPr>
@@ -1970,8 +1980,8 @@
         </p:nvSpPr>
         <p:spPr>
           <a:xfrm>
-            <a:off x="838080" y="365040"/>
-            <a:ext cx="10515240" cy="1325520"/>
+            <a:off x="609480" y="273600"/>
+            <a:ext cx="10972440" cy="1144800"/>
           </a:xfrm>
           <a:prstGeom prst="rect">
             <a:avLst/>
@@ -1980,13 +1990,14 @@
         <p:txBody>
           <a:bodyPr lIns="0" rIns="0" tIns="0" bIns="0" anchor="ctr"/>
           <a:p>
-            <a:endParaRPr/>
-          </a:p>
-        </p:txBody>
-      </p:sp>
-      <p:sp>
-        <p:nvSpPr>
-          <p:cNvPr id="15" name="PlaceHolder 2"/>
+            <a:pPr algn="ctr"/>
+            <a:endParaRPr/>
+          </a:p>
+        </p:txBody>
+      </p:sp>
+      <p:sp>
+        <p:nvSpPr>
+          <p:cNvPr id="12" name="PlaceHolder 2"/>
           <p:cNvSpPr>
             <a:spLocks noGrp="1"/>
           </p:cNvSpPr>
@@ -1996,8 +2007,8 @@
         </p:nvSpPr>
         <p:spPr>
           <a:xfrm>
-            <a:off x="838080" y="1825560"/>
-            <a:ext cx="5131080" cy="2075040"/>
+            <a:off x="609480" y="1604520"/>
+            <a:ext cx="5354280" cy="1896840"/>
           </a:xfrm>
           <a:prstGeom prst="rect">
             <a:avLst/>
@@ -2012,7 +2023,7 @@
       </p:sp>
       <p:sp>
         <p:nvSpPr>
-          <p:cNvPr id="16" name="PlaceHolder 3"/>
+          <p:cNvPr id="13" name="PlaceHolder 3"/>
           <p:cNvSpPr>
             <a:spLocks noGrp="1"/>
           </p:cNvSpPr>
@@ -2022,8 +2033,8 @@
         </p:nvSpPr>
         <p:spPr>
           <a:xfrm>
-            <a:off x="838080" y="4098240"/>
-            <a:ext cx="5131080" cy="2075040"/>
+            <a:off x="609480" y="3682080"/>
+            <a:ext cx="5354280" cy="1896840"/>
           </a:xfrm>
           <a:prstGeom prst="rect">
             <a:avLst/>
@@ -2038,7 +2049,7 @@
       </p:sp>
       <p:sp>
         <p:nvSpPr>
-          <p:cNvPr id="17" name="PlaceHolder 4"/>
+          <p:cNvPr id="14" name="PlaceHolder 4"/>
           <p:cNvSpPr>
             <a:spLocks noGrp="1"/>
           </p:cNvSpPr>
@@ -2048,8 +2059,8 @@
         </p:nvSpPr>
         <p:spPr>
           <a:xfrm>
-            <a:off x="6226200" y="1825560"/>
-            <a:ext cx="5131080" cy="4350960"/>
+            <a:off x="6231960" y="1604520"/>
+            <a:ext cx="5354280" cy="3977280"/>
           </a:xfrm>
           <a:prstGeom prst="rect">
             <a:avLst/>
@@ -2086,7 +2097,7 @@
       </p:grpSpPr>
       <p:sp>
         <p:nvSpPr>
-          <p:cNvPr id="18" name="PlaceHolder 1"/>
+          <p:cNvPr id="15" name="PlaceHolder 1"/>
           <p:cNvSpPr>
             <a:spLocks noGrp="1"/>
           </p:cNvSpPr>
@@ -2096,8 +2107,8 @@
         </p:nvSpPr>
         <p:spPr>
           <a:xfrm>
-            <a:off x="838080" y="365040"/>
-            <a:ext cx="10515240" cy="1325520"/>
+            <a:off x="609480" y="273600"/>
+            <a:ext cx="10972440" cy="1144800"/>
           </a:xfrm>
           <a:prstGeom prst="rect">
             <a:avLst/>
@@ -2106,13 +2117,14 @@
         <p:txBody>
           <a:bodyPr lIns="0" rIns="0" tIns="0" bIns="0" anchor="ctr"/>
           <a:p>
-            <a:endParaRPr/>
-          </a:p>
-        </p:txBody>
-      </p:sp>
-      <p:sp>
-        <p:nvSpPr>
-          <p:cNvPr id="19" name="PlaceHolder 2"/>
+            <a:pPr algn="ctr"/>
+            <a:endParaRPr/>
+          </a:p>
+        </p:txBody>
+      </p:sp>
+      <p:sp>
+        <p:nvSpPr>
+          <p:cNvPr id="16" name="PlaceHolder 2"/>
           <p:cNvSpPr>
             <a:spLocks noGrp="1"/>
           </p:cNvSpPr>
@@ -2122,8 +2134,8 @@
         </p:nvSpPr>
         <p:spPr>
           <a:xfrm>
-            <a:off x="838080" y="1825560"/>
-            <a:ext cx="5131080" cy="4350960"/>
+            <a:off x="609480" y="1604520"/>
+            <a:ext cx="5354280" cy="3977280"/>
           </a:xfrm>
           <a:prstGeom prst="rect">
             <a:avLst/>
@@ -2138,7 +2150,7 @@
       </p:sp>
       <p:sp>
         <p:nvSpPr>
-          <p:cNvPr id="20" name="PlaceHolder 3"/>
+          <p:cNvPr id="17" name="PlaceHolder 3"/>
           <p:cNvSpPr>
             <a:spLocks noGrp="1"/>
           </p:cNvSpPr>
@@ -2148,8 +2160,8 @@
         </p:nvSpPr>
         <p:spPr>
           <a:xfrm>
-            <a:off x="6226200" y="1825560"/>
-            <a:ext cx="5131080" cy="2075040"/>
+            <a:off x="6231960" y="1604520"/>
+            <a:ext cx="5354280" cy="1896840"/>
           </a:xfrm>
           <a:prstGeom prst="rect">
             <a:avLst/>
@@ -2164,7 +2176,7 @@
       </p:sp>
       <p:sp>
         <p:nvSpPr>
-          <p:cNvPr id="21" name="PlaceHolder 4"/>
+          <p:cNvPr id="18" name="PlaceHolder 4"/>
           <p:cNvSpPr>
             <a:spLocks noGrp="1"/>
           </p:cNvSpPr>
@@ -2174,8 +2186,8 @@
         </p:nvSpPr>
         <p:spPr>
           <a:xfrm>
-            <a:off x="6226200" y="4098240"/>
-            <a:ext cx="5131080" cy="2075040"/>
+            <a:off x="6231960" y="3682080"/>
+            <a:ext cx="5354280" cy="1896840"/>
           </a:xfrm>
           <a:prstGeom prst="rect">
             <a:avLst/>
@@ -2212,7 +2224,7 @@
       </p:grpSpPr>
       <p:sp>
         <p:nvSpPr>
-          <p:cNvPr id="22" name="PlaceHolder 1"/>
+          <p:cNvPr id="19" name="PlaceHolder 1"/>
           <p:cNvSpPr>
             <a:spLocks noGrp="1"/>
           </p:cNvSpPr>
@@ -2222,8 +2234,8 @@
         </p:nvSpPr>
         <p:spPr>
           <a:xfrm>
-            <a:off x="838080" y="365040"/>
-            <a:ext cx="10515240" cy="1325520"/>
+            <a:off x="609480" y="273600"/>
+            <a:ext cx="10972440" cy="1144800"/>
           </a:xfrm>
           <a:prstGeom prst="rect">
             <a:avLst/>
@@ -2232,13 +2244,14 @@
         <p:txBody>
           <a:bodyPr lIns="0" rIns="0" tIns="0" bIns="0" anchor="ctr"/>
           <a:p>
-            <a:endParaRPr/>
-          </a:p>
-        </p:txBody>
-      </p:sp>
-      <p:sp>
-        <p:nvSpPr>
-          <p:cNvPr id="23" name="PlaceHolder 2"/>
+            <a:pPr algn="ctr"/>
+            <a:endParaRPr/>
+          </a:p>
+        </p:txBody>
+      </p:sp>
+      <p:sp>
+        <p:nvSpPr>
+          <p:cNvPr id="20" name="PlaceHolder 2"/>
           <p:cNvSpPr>
             <a:spLocks noGrp="1"/>
           </p:cNvSpPr>
@@ -2248,8 +2261,8 @@
         </p:nvSpPr>
         <p:spPr>
           <a:xfrm>
-            <a:off x="838080" y="1825560"/>
-            <a:ext cx="5131080" cy="2075040"/>
+            <a:off x="609480" y="1604520"/>
+            <a:ext cx="5354280" cy="1896840"/>
           </a:xfrm>
           <a:prstGeom prst="rect">
             <a:avLst/>
@@ -2264,7 +2277,7 @@
       </p:sp>
       <p:sp>
         <p:nvSpPr>
-          <p:cNvPr id="24" name="PlaceHolder 3"/>
+          <p:cNvPr id="21" name="PlaceHolder 3"/>
           <p:cNvSpPr>
             <a:spLocks noGrp="1"/>
           </p:cNvSpPr>
@@ -2274,8 +2287,8 @@
         </p:nvSpPr>
         <p:spPr>
           <a:xfrm>
-            <a:off x="6226200" y="1825560"/>
-            <a:ext cx="5131080" cy="2075040"/>
+            <a:off x="6231960" y="1604520"/>
+            <a:ext cx="5354280" cy="1896840"/>
           </a:xfrm>
           <a:prstGeom prst="rect">
             <a:avLst/>
@@ -2290,7 +2303,7 @@
       </p:sp>
       <p:sp>
         <p:nvSpPr>
-          <p:cNvPr id="25" name="PlaceHolder 4"/>
+          <p:cNvPr id="22" name="PlaceHolder 4"/>
           <p:cNvSpPr>
             <a:spLocks noGrp="1"/>
           </p:cNvSpPr>
@@ -2300,8 +2313,8 @@
         </p:nvSpPr>
         <p:spPr>
           <a:xfrm>
-            <a:off x="838080" y="4098240"/>
-            <a:ext cx="10515240" cy="2075040"/>
+            <a:off x="609480" y="3682080"/>
+            <a:ext cx="10972440" cy="1896840"/>
           </a:xfrm>
           <a:prstGeom prst="rect">
             <a:avLst/>
@@ -2348,29 +2361,21 @@
         </p:nvSpPr>
         <p:spPr>
           <a:xfrm>
-            <a:off x="1523880" y="1122480"/>
-            <a:ext cx="9143640" cy="2387160"/>
-          </a:xfrm>
-          <a:prstGeom prst="rect">
-            <a:avLst/>
-          </a:prstGeom>
-        </p:spPr>
-        <p:txBody>
-          <a:bodyPr anchor="b"/>
-          <a:p>
-            <a:pPr algn="ctr">
-              <a:lnSpc>
-                <a:spcPct val="100000"/>
-              </a:lnSpc>
-            </a:pPr>
-            <a:r>
-              <a:rPr lang="en-US" sz="6000">
-                <a:solidFill>
-                  <a:srgbClr val="000000"/>
-                </a:solidFill>
-                <a:latin typeface="Calibri Light"/>
-              </a:rPr>
-              <a:t>Kliknij, aby edytować format tekstu tytułuClick to edit Master title style</a:t>
+            <a:off x="838080" y="365040"/>
+            <a:ext cx="10514880" cy="1325160"/>
+          </a:xfrm>
+          <a:prstGeom prst="rect">
+            <a:avLst/>
+          </a:prstGeom>
+        </p:spPr>
+        <p:txBody>
+          <a:bodyPr lIns="0" rIns="0" tIns="0" bIns="0" anchor="ctr"/>
+          <a:p>
+            <a:r>
+              <a:rPr lang="pl-PL">
+                <a:latin typeface="Arial"/>
+              </a:rPr>
+              <a:t>Kliknij, aby edytować format tekstu tytułu</a:t>
             </a:r>
             <a:endParaRPr/>
           </a:p>
@@ -2379,112 +2384,6 @@
       <p:sp>
         <p:nvSpPr>
           <p:cNvPr id="1" name="PlaceHolder 2"/>
-          <p:cNvSpPr>
-            <a:spLocks noGrp="1"/>
-          </p:cNvSpPr>
-          <p:nvPr>
-            <p:ph type="dt"/>
-          </p:nvPr>
-        </p:nvSpPr>
-        <p:spPr>
-          <a:xfrm>
-            <a:off x="838080" y="6356520"/>
-            <a:ext cx="2742840" cy="364680"/>
-          </a:xfrm>
-          <a:prstGeom prst="rect">
-            <a:avLst/>
-          </a:prstGeom>
-        </p:spPr>
-        <p:txBody>
-          <a:bodyPr anchor="ctr"/>
-          <a:p>
-            <a:pPr>
-              <a:lnSpc>
-                <a:spcPct val="100000"/>
-              </a:lnSpc>
-            </a:pPr>
-            <a:r>
-              <a:rPr lang="pl-PL" sz="1200">
-                <a:solidFill>
-                  <a:srgbClr val="8b8b8b"/>
-                </a:solidFill>
-                <a:latin typeface="Calibri"/>
-              </a:rPr>
-              <a:t>15-5-27</a:t>
-            </a:r>
-            <a:endParaRPr/>
-          </a:p>
-        </p:txBody>
-      </p:sp>
-      <p:sp>
-        <p:nvSpPr>
-          <p:cNvPr id="2" name="PlaceHolder 3"/>
-          <p:cNvSpPr>
-            <a:spLocks noGrp="1"/>
-          </p:cNvSpPr>
-          <p:nvPr>
-            <p:ph type="ftr"/>
-          </p:nvPr>
-        </p:nvSpPr>
-        <p:spPr>
-          <a:xfrm>
-            <a:off x="4038480" y="6356520"/>
-            <a:ext cx="4114440" cy="364680"/>
-          </a:xfrm>
-          <a:prstGeom prst="rect">
-            <a:avLst/>
-          </a:prstGeom>
-        </p:spPr>
-        <p:txBody>
-          <a:bodyPr anchor="ctr"/>
-          <a:p>
-            <a:endParaRPr/>
-          </a:p>
-        </p:txBody>
-      </p:sp>
-      <p:sp>
-        <p:nvSpPr>
-          <p:cNvPr id="3" name="PlaceHolder 4"/>
-          <p:cNvSpPr>
-            <a:spLocks noGrp="1"/>
-          </p:cNvSpPr>
-          <p:nvPr>
-            <p:ph type="sldNum"/>
-          </p:nvPr>
-        </p:nvSpPr>
-        <p:spPr>
-          <a:xfrm>
-            <a:off x="8610480" y="6356520"/>
-            <a:ext cx="2742840" cy="364680"/>
-          </a:xfrm>
-          <a:prstGeom prst="rect">
-            <a:avLst/>
-          </a:prstGeom>
-        </p:spPr>
-        <p:txBody>
-          <a:bodyPr anchor="ctr"/>
-          <a:p>
-            <a:pPr algn="r">
-              <a:lnSpc>
-                <a:spcPct val="100000"/>
-              </a:lnSpc>
-            </a:pPr>
-            <a:fld id="{05F9139F-C070-47F6-8509-77EFAB00615E}" type="slidenum">
-              <a:rPr lang="pl-PL" sz="1200">
-                <a:solidFill>
-                  <a:srgbClr val="8b8b8b"/>
-                </a:solidFill>
-                <a:latin typeface="Calibri"/>
-              </a:rPr>
-              <a:t>&lt;numer&gt;</a:t>
-            </a:fld>
-            <a:endParaRPr/>
-          </a:p>
-        </p:txBody>
-      </p:sp>
-      <p:sp>
-        <p:nvSpPr>
-          <p:cNvPr id="4" name="PlaceHolder 5"/>
           <p:cNvSpPr>
             <a:spLocks noGrp="1"/>
           </p:cNvSpPr>
@@ -2510,8 +2409,8 @@
               <a:buChar char=""/>
             </a:pPr>
             <a:r>
-              <a:rPr lang="en-US" sz="2800">
-                <a:latin typeface="Calibri"/>
+              <a:rPr lang="pl-PL" sz="3200">
+                <a:latin typeface="Arial"/>
               </a:rPr>
               <a:t>Kliknij, aby edytować format tekstu konspektu</a:t>
             </a:r>
@@ -2524,8 +2423,8 @@
               <a:buChar char=""/>
             </a:pPr>
             <a:r>
-              <a:rPr lang="en-US" sz="2000">
-                <a:latin typeface="Calibri"/>
+              <a:rPr lang="pl-PL" sz="2800">
+                <a:latin typeface="Arial"/>
               </a:rPr>
               <a:t>Drugi poziom konspektu</a:t>
             </a:r>
@@ -2538,8 +2437,8 @@
               <a:buChar char=""/>
             </a:pPr>
             <a:r>
-              <a:rPr lang="en-US">
-                <a:latin typeface="Calibri"/>
+              <a:rPr lang="pl-PL" sz="2400">
+                <a:latin typeface="Arial"/>
               </a:rPr>
               <a:t>Trzeci poziom konspektu</a:t>
             </a:r>
@@ -2552,8 +2451,8 @@
               <a:buChar char=""/>
             </a:pPr>
             <a:r>
-              <a:rPr lang="en-US">
-                <a:latin typeface="Calibri"/>
+              <a:rPr lang="pl-PL" sz="2000">
+                <a:latin typeface="Arial"/>
               </a:rPr>
               <a:t>Czwarty poziom konspektu</a:t>
             </a:r>
@@ -2566,8 +2465,8 @@
               <a:buChar char=""/>
             </a:pPr>
             <a:r>
-              <a:rPr lang="en-US" sz="2000">
-                <a:latin typeface="Calibri"/>
+              <a:rPr lang="pl-PL" sz="2000">
+                <a:latin typeface="Arial"/>
               </a:rPr>
               <a:t>Piąty poziom konspektu</a:t>
             </a:r>
@@ -2580,8 +2479,8 @@
               <a:buChar char=""/>
             </a:pPr>
             <a:r>
-              <a:rPr lang="en-US" sz="2000">
-                <a:latin typeface="Calibri"/>
+              <a:rPr lang="pl-PL" sz="2000">
+                <a:latin typeface="Arial"/>
               </a:rPr>
               <a:t>Szósty poziom konspektu</a:t>
             </a:r>
@@ -2594,8 +2493,8 @@
               <a:buChar char=""/>
             </a:pPr>
             <a:r>
-              <a:rPr lang="en-US" sz="2000">
-                <a:latin typeface="Calibri"/>
+              <a:rPr lang="pl-PL" sz="2000">
+                <a:latin typeface="Arial"/>
               </a:rPr>
               <a:t>Siódmy poziom konspektu</a:t>
             </a:r>
@@ -2642,7 +2541,7 @@
       </p:grpSpPr>
       <p:sp>
         <p:nvSpPr>
-          <p:cNvPr id="39" name="PlaceHolder 1"/>
+          <p:cNvPr id="36" name="PlaceHolder 1"/>
           <p:cNvSpPr>
             <a:spLocks noGrp="1"/>
           </p:cNvSpPr>
@@ -2652,37 +2551,30 @@
         </p:nvSpPr>
         <p:spPr>
           <a:xfrm>
-            <a:off x="838080" y="365040"/>
-            <a:ext cx="10515240" cy="1325160"/>
-          </a:xfrm>
-          <a:prstGeom prst="rect">
-            <a:avLst/>
-          </a:prstGeom>
-        </p:spPr>
-        <p:txBody>
-          <a:bodyPr anchor="ctr"/>
-          <a:p>
-            <a:pPr>
-              <a:lnSpc>
-                <a:spcPct val="90000"/>
-              </a:lnSpc>
-            </a:pPr>
-            <a:r>
-              <a:rPr lang="en-US" sz="4400">
-                <a:solidFill>
-                  <a:srgbClr val="000000"/>
-                </a:solidFill>
-                <a:latin typeface="Calibri Light"/>
-              </a:rPr>
-              <a:t>Kliknij, aby edytować format tekstu tytułuClick to edit Master title style</a:t>
-            </a:r>
-            <a:endParaRPr/>
-          </a:p>
-        </p:txBody>
-      </p:sp>
-      <p:sp>
-        <p:nvSpPr>
-          <p:cNvPr id="40" name="PlaceHolder 2"/>
+            <a:off x="609480" y="273600"/>
+            <a:ext cx="10972440" cy="1144800"/>
+          </a:xfrm>
+          <a:prstGeom prst="rect">
+            <a:avLst/>
+          </a:prstGeom>
+        </p:spPr>
+        <p:txBody>
+          <a:bodyPr lIns="0" rIns="0" tIns="0" bIns="0" anchor="ctr"/>
+          <a:p>
+            <a:pPr algn="ctr"/>
+            <a:r>
+              <a:rPr lang="pl-PL" sz="4400">
+                <a:latin typeface="Arial"/>
+              </a:rPr>
+              <a:t>Kliknij, aby edytować format tekstu tytułu</a:t>
+            </a:r>
+            <a:endParaRPr/>
+          </a:p>
+        </p:txBody>
+      </p:sp>
+      <p:sp>
+        <p:nvSpPr>
+          <p:cNvPr id="37" name="PlaceHolder 2"/>
           <p:cNvSpPr>
             <a:spLocks noGrp="1"/>
           </p:cNvSpPr>
@@ -2692,15 +2584,15 @@
         </p:nvSpPr>
         <p:spPr>
           <a:xfrm>
-            <a:off x="838080" y="1825560"/>
-            <a:ext cx="10515240" cy="4350960"/>
-          </a:xfrm>
-          <a:prstGeom prst="rect">
-            <a:avLst/>
-          </a:prstGeom>
-        </p:spPr>
-        <p:txBody>
-          <a:bodyPr/>
+            <a:off x="609480" y="1604520"/>
+            <a:ext cx="10972440" cy="3977280"/>
+          </a:xfrm>
+          <a:prstGeom prst="rect">
+            <a:avLst/>
+          </a:prstGeom>
+        </p:spPr>
+        <p:txBody>
+          <a:bodyPr lIns="0" rIns="0" tIns="0" bIns="0"/>
           <a:p>
             <a:pPr>
               <a:buSzPct val="45000"/>
@@ -2708,11 +2600,8 @@
               <a:buChar char=""/>
             </a:pPr>
             <a:r>
-              <a:rPr lang="en-US" sz="2800">
-                <a:solidFill>
-                  <a:srgbClr val="000000"/>
-                </a:solidFill>
-                <a:latin typeface="Calibri"/>
+              <a:rPr lang="pl-PL" sz="3200">
+                <a:latin typeface="Arial"/>
               </a:rPr>
               <a:t>Kliknij, aby edytować format tekstu konspektu</a:t>
             </a:r>
@@ -2725,11 +2614,8 @@
               <a:buChar char=""/>
             </a:pPr>
             <a:r>
-              <a:rPr lang="en-US" sz="2800">
-                <a:solidFill>
-                  <a:srgbClr val="000000"/>
-                </a:solidFill>
-                <a:latin typeface="Calibri"/>
+              <a:rPr lang="pl-PL" sz="2800">
+                <a:latin typeface="Arial"/>
               </a:rPr>
               <a:t>Drugi poziom konspektu</a:t>
             </a:r>
@@ -2742,11 +2628,8 @@
               <a:buChar char=""/>
             </a:pPr>
             <a:r>
-              <a:rPr lang="en-US" sz="2800">
-                <a:solidFill>
-                  <a:srgbClr val="000000"/>
-                </a:solidFill>
-                <a:latin typeface="Calibri"/>
+              <a:rPr lang="pl-PL" sz="2400">
+                <a:latin typeface="Arial"/>
               </a:rPr>
               <a:t>Trzeci poziom konspektu</a:t>
             </a:r>
@@ -2759,11 +2642,8 @@
               <a:buChar char=""/>
             </a:pPr>
             <a:r>
-              <a:rPr lang="en-US" sz="2800">
-                <a:solidFill>
-                  <a:srgbClr val="000000"/>
-                </a:solidFill>
-                <a:latin typeface="Calibri"/>
+              <a:rPr lang="pl-PL" sz="2000">
+                <a:latin typeface="Arial"/>
               </a:rPr>
               <a:t>Czwarty poziom konspektu</a:t>
             </a:r>
@@ -2776,11 +2656,8 @@
               <a:buChar char=""/>
             </a:pPr>
             <a:r>
-              <a:rPr lang="en-US" sz="2800">
-                <a:solidFill>
-                  <a:srgbClr val="000000"/>
-                </a:solidFill>
-                <a:latin typeface="Calibri"/>
+              <a:rPr lang="pl-PL" sz="2000">
+                <a:latin typeface="Arial"/>
               </a:rPr>
               <a:t>Piąty poziom konspektu</a:t>
             </a:r>
@@ -2793,215 +2670,25 @@
               <a:buChar char=""/>
             </a:pPr>
             <a:r>
-              <a:rPr lang="en-US" sz="2800">
-                <a:solidFill>
-                  <a:srgbClr val="000000"/>
-                </a:solidFill>
-                <a:latin typeface="Calibri"/>
+              <a:rPr lang="pl-PL" sz="2000">
+                <a:latin typeface="Arial"/>
               </a:rPr>
               <a:t>Szósty poziom konspektu</a:t>
             </a:r>
             <a:endParaRPr/>
           </a:p>
           <a:p>
-            <a:pPr>
-              <a:lnSpc>
-                <a:spcPct val="100000"/>
-              </a:lnSpc>
-              <a:buFont typeface="Arial"/>
-              <a:buChar char="•"/>
+            <a:pPr lvl="6">
+              <a:buSzPct val="45000"/>
+              <a:buFont typeface="StarSymbol"/>
+              <a:buChar char=""/>
             </a:pPr>
             <a:r>
-              <a:rPr lang="en-US" sz="2800">
-                <a:solidFill>
-                  <a:srgbClr val="000000"/>
-                </a:solidFill>
-                <a:latin typeface="Calibri"/>
-              </a:rPr>
-              <a:t>Siódmy poziom konspektuClick to edit Master text styles</a:t>
-            </a:r>
-            <a:endParaRPr/>
-          </a:p>
-          <a:p>
-            <a:pPr lvl="1">
-              <a:lnSpc>
-                <a:spcPct val="100000"/>
-              </a:lnSpc>
-              <a:buFont typeface="Arial"/>
-              <a:buChar char="•"/>
-            </a:pPr>
-            <a:r>
-              <a:rPr lang="en-US" sz="2400">
-                <a:solidFill>
-                  <a:srgbClr val="000000"/>
-                </a:solidFill>
-                <a:latin typeface="Calibri"/>
-              </a:rPr>
-              <a:t>Second level</a:t>
-            </a:r>
-            <a:endParaRPr/>
-          </a:p>
-          <a:p>
-            <a:pPr lvl="2">
-              <a:lnSpc>
-                <a:spcPct val="100000"/>
-              </a:lnSpc>
-              <a:buFont typeface="Arial"/>
-              <a:buChar char="•"/>
-            </a:pPr>
-            <a:r>
-              <a:rPr lang="en-US" sz="2000">
-                <a:solidFill>
-                  <a:srgbClr val="000000"/>
-                </a:solidFill>
-                <a:latin typeface="Calibri"/>
-              </a:rPr>
-              <a:t>Third level</a:t>
-            </a:r>
-            <a:endParaRPr/>
-          </a:p>
-          <a:p>
-            <a:pPr lvl="3">
-              <a:lnSpc>
-                <a:spcPct val="100000"/>
-              </a:lnSpc>
-              <a:buFont typeface="Arial"/>
-              <a:buChar char="•"/>
-            </a:pPr>
-            <a:r>
-              <a:rPr lang="en-US">
-                <a:solidFill>
-                  <a:srgbClr val="000000"/>
-                </a:solidFill>
-                <a:latin typeface="Calibri"/>
-              </a:rPr>
-              <a:t>Fourth level</a:t>
-            </a:r>
-            <a:endParaRPr/>
-          </a:p>
-          <a:p>
-            <a:pPr lvl="4">
-              <a:lnSpc>
-                <a:spcPct val="100000"/>
-              </a:lnSpc>
-              <a:buFont typeface="Arial"/>
-              <a:buChar char="•"/>
-            </a:pPr>
-            <a:r>
-              <a:rPr lang="en-US">
-                <a:solidFill>
-                  <a:srgbClr val="000000"/>
-                </a:solidFill>
-                <a:latin typeface="Calibri"/>
-              </a:rPr>
-              <a:t>Fifth level</a:t>
-            </a:r>
-            <a:endParaRPr/>
-          </a:p>
-        </p:txBody>
-      </p:sp>
-      <p:sp>
-        <p:nvSpPr>
-          <p:cNvPr id="41" name="PlaceHolder 3"/>
-          <p:cNvSpPr>
-            <a:spLocks noGrp="1"/>
-          </p:cNvSpPr>
-          <p:nvPr>
-            <p:ph type="dt"/>
-          </p:nvPr>
-        </p:nvSpPr>
-        <p:spPr>
-          <a:xfrm>
-            <a:off x="838080" y="6356520"/>
-            <a:ext cx="2742840" cy="364680"/>
-          </a:xfrm>
-          <a:prstGeom prst="rect">
-            <a:avLst/>
-          </a:prstGeom>
-        </p:spPr>
-        <p:txBody>
-          <a:bodyPr anchor="ctr"/>
-          <a:p>
-            <a:pPr>
-              <a:lnSpc>
-                <a:spcPct val="100000"/>
-              </a:lnSpc>
-            </a:pPr>
-            <a:r>
-              <a:rPr lang="pl-PL" sz="1200">
-                <a:solidFill>
-                  <a:srgbClr val="8b8b8b"/>
-                </a:solidFill>
-                <a:latin typeface="Calibri"/>
-              </a:rPr>
-              <a:t>15-5-27</a:t>
-            </a:r>
-            <a:endParaRPr/>
-          </a:p>
-        </p:txBody>
-      </p:sp>
-      <p:sp>
-        <p:nvSpPr>
-          <p:cNvPr id="42" name="PlaceHolder 4"/>
-          <p:cNvSpPr>
-            <a:spLocks noGrp="1"/>
-          </p:cNvSpPr>
-          <p:nvPr>
-            <p:ph type="ftr"/>
-          </p:nvPr>
-        </p:nvSpPr>
-        <p:spPr>
-          <a:xfrm>
-            <a:off x="4038480" y="6356520"/>
-            <a:ext cx="4114440" cy="364680"/>
-          </a:xfrm>
-          <a:prstGeom prst="rect">
-            <a:avLst/>
-          </a:prstGeom>
-        </p:spPr>
-        <p:txBody>
-          <a:bodyPr anchor="ctr"/>
-          <a:p>
-            <a:endParaRPr/>
-          </a:p>
-        </p:txBody>
-      </p:sp>
-      <p:sp>
-        <p:nvSpPr>
-          <p:cNvPr id="43" name="PlaceHolder 5"/>
-          <p:cNvSpPr>
-            <a:spLocks noGrp="1"/>
-          </p:cNvSpPr>
-          <p:nvPr>
-            <p:ph type="sldNum"/>
-          </p:nvPr>
-        </p:nvSpPr>
-        <p:spPr>
-          <a:xfrm>
-            <a:off x="8610480" y="6356520"/>
-            <a:ext cx="2742840" cy="364680"/>
-          </a:xfrm>
-          <a:prstGeom prst="rect">
-            <a:avLst/>
-          </a:prstGeom>
-        </p:spPr>
-        <p:txBody>
-          <a:bodyPr anchor="ctr"/>
-          <a:p>
-            <a:pPr algn="r">
-              <a:lnSpc>
-                <a:spcPct val="100000"/>
-              </a:lnSpc>
-            </a:pPr>
-            <a:fld id="{3F8884CA-8AFE-477C-A7D8-6B9D30B8B7E5}" type="slidenum">
-              <a:rPr lang="pl-PL" sz="1200">
-                <a:solidFill>
-                  <a:srgbClr val="8b8b8b"/>
-                </a:solidFill>
-                <a:latin typeface="Calibri"/>
-              </a:rPr>
-              <a:t>&lt;numer&gt;</a:t>
-            </a:fld>
+              <a:rPr lang="pl-PL" sz="2000">
+                <a:latin typeface="Arial"/>
+              </a:rPr>
+              <a:t>Siódmy poziom konspektu</a:t>
+            </a:r>
             <a:endParaRPr/>
           </a:p>
         </p:txBody>
@@ -3045,21 +2732,31 @@
       </p:grpSpPr>
       <p:sp>
         <p:nvSpPr>
-          <p:cNvPr id="78" name="TextShape 1"/>
-          <p:cNvSpPr txBox="1"/>
+          <p:cNvPr id="72" name="CustomShape 1"/>
+          <p:cNvSpPr/>
           <p:nvPr/>
         </p:nvSpPr>
         <p:spPr>
           <a:xfrm>
             <a:off x="1523880" y="1122480"/>
-            <a:ext cx="9143640" cy="2387160"/>
-          </a:xfrm>
-          <a:prstGeom prst="rect">
-            <a:avLst/>
-          </a:prstGeom>
-        </p:spPr>
-        <p:txBody>
-          <a:bodyPr anchor="b"/>
+            <a:ext cx="9143280" cy="2386800"/>
+          </a:xfrm>
+          <a:prstGeom prst="rect">
+            <a:avLst/>
+          </a:prstGeom>
+          <a:noFill/>
+          <a:ln>
+            <a:noFill/>
+          </a:ln>
+        </p:spPr>
+        <p:style>
+          <a:lnRef idx="0"/>
+          <a:fillRef idx="0"/>
+          <a:effectRef idx="0"/>
+          <a:fontRef idx="minor"/>
+        </p:style>
+        <p:txBody>
+          <a:bodyPr lIns="90000" rIns="90000" tIns="45000" bIns="45000" anchor="b"/>
           <a:p>
             <a:pPr algn="ctr">
               <a:lnSpc>
@@ -3067,7 +2764,7 @@
               </a:lnSpc>
             </a:pPr>
             <a:r>
-              <a:rPr lang="en-US" sz="6000">
+              <a:rPr lang="pl-PL" sz="6000" strike="noStrike">
                 <a:solidFill>
                   <a:srgbClr val="000000"/>
                 </a:solidFill>
@@ -3081,21 +2778,31 @@
       </p:sp>
       <p:sp>
         <p:nvSpPr>
-          <p:cNvPr id="79" name="TextShape 2"/>
-          <p:cNvSpPr txBox="1"/>
+          <p:cNvPr id="73" name="CustomShape 2"/>
+          <p:cNvSpPr/>
           <p:nvPr/>
         </p:nvSpPr>
         <p:spPr>
           <a:xfrm>
             <a:off x="1523880" y="3602160"/>
-            <a:ext cx="9143640" cy="1655280"/>
-          </a:xfrm>
-          <a:prstGeom prst="rect">
-            <a:avLst/>
-          </a:prstGeom>
-        </p:spPr>
-        <p:txBody>
-          <a:bodyPr/>
+            <a:ext cx="9143280" cy="1654920"/>
+          </a:xfrm>
+          <a:prstGeom prst="rect">
+            <a:avLst/>
+          </a:prstGeom>
+          <a:noFill/>
+          <a:ln>
+            <a:noFill/>
+          </a:ln>
+        </p:spPr>
+        <p:style>
+          <a:lnRef idx="0"/>
+          <a:fillRef idx="0"/>
+          <a:effectRef idx="0"/>
+          <a:fontRef idx="minor"/>
+        </p:style>
+        <p:txBody>
+          <a:bodyPr lIns="90000" rIns="90000" tIns="45000" bIns="45000"/>
           <a:p>
             <a:pPr algn="ctr">
               <a:lnSpc>
@@ -3103,7 +2810,7 @@
               </a:lnSpc>
             </a:pPr>
             <a:r>
-              <a:rPr lang="pl-PL" sz="2400">
+              <a:rPr lang="pl-PL" sz="2400" strike="noStrike">
                 <a:solidFill>
                   <a:srgbClr val="000000"/>
                 </a:solidFill>
@@ -3117,14 +2824,14 @@
       </p:sp>
       <p:sp>
         <p:nvSpPr>
-          <p:cNvPr id="80" name="CustomShape 3"/>
+          <p:cNvPr id="74" name="CustomShape 3"/>
           <p:cNvSpPr/>
           <p:nvPr/>
         </p:nvSpPr>
         <p:spPr>
           <a:xfrm>
             <a:off x="9403920" y="5257800"/>
-            <a:ext cx="2787840" cy="1461960"/>
+            <a:ext cx="2787480" cy="1461600"/>
           </a:xfrm>
           <a:prstGeom prst="rect">
             <a:avLst/>
@@ -3134,6 +2841,12 @@
             <a:noFill/>
           </a:ln>
         </p:spPr>
+        <p:style>
+          <a:lnRef idx="0"/>
+          <a:fillRef idx="0"/>
+          <a:effectRef idx="0"/>
+          <a:fontRef idx="minor"/>
+        </p:style>
         <p:txBody>
           <a:bodyPr lIns="90000" rIns="90000" tIns="45000" bIns="45000"/>
           <a:p>
@@ -3143,7 +2856,7 @@
               </a:lnSpc>
             </a:pPr>
             <a:r>
-              <a:rPr lang="pl-PL">
+              <a:rPr lang="pl-PL" strike="noStrike">
                 <a:solidFill>
                   <a:srgbClr val="000000"/>
                 </a:solidFill>
@@ -3160,7 +2873,7 @@
               </a:lnSpc>
             </a:pPr>
             <a:r>
-              <a:rPr lang="pl-PL">
+              <a:rPr lang="pl-PL" strike="noStrike">
                 <a:solidFill>
                   <a:srgbClr val="000000"/>
                 </a:solidFill>
@@ -3177,7 +2890,7 @@
               </a:lnSpc>
             </a:pPr>
             <a:r>
-              <a:rPr lang="pl-PL">
+              <a:rPr lang="pl-PL" strike="noStrike">
                 <a:solidFill>
                   <a:srgbClr val="000000"/>
                 </a:solidFill>
@@ -3194,7 +2907,7 @@
               </a:lnSpc>
             </a:pPr>
             <a:r>
-              <a:rPr lang="pl-PL">
+              <a:rPr lang="pl-PL" strike="noStrike">
                 <a:solidFill>
                   <a:srgbClr val="000000"/>
                 </a:solidFill>
@@ -3211,7 +2924,7 @@
               </a:lnSpc>
             </a:pPr>
             <a:r>
-              <a:rPr lang="pl-PL">
+              <a:rPr lang="pl-PL" strike="noStrike">
                 <a:solidFill>
                   <a:srgbClr val="000000"/>
                 </a:solidFill>
@@ -3225,14 +2938,14 @@
       </p:sp>
       <p:sp>
         <p:nvSpPr>
-          <p:cNvPr id="81" name="CustomShape 4"/>
+          <p:cNvPr id="75" name="CustomShape 4"/>
           <p:cNvSpPr/>
           <p:nvPr/>
         </p:nvSpPr>
         <p:spPr>
           <a:xfrm>
             <a:off x="311760" y="5257800"/>
-            <a:ext cx="2867400" cy="1187640"/>
+            <a:ext cx="2867040" cy="1187280"/>
           </a:xfrm>
           <a:prstGeom prst="rect">
             <a:avLst/>
@@ -3242,6 +2955,12 @@
             <a:noFill/>
           </a:ln>
         </p:spPr>
+        <p:style>
+          <a:lnRef idx="0"/>
+          <a:fillRef idx="0"/>
+          <a:effectRef idx="0"/>
+          <a:fontRef idx="minor"/>
+        </p:style>
         <p:txBody>
           <a:bodyPr lIns="90000" rIns="90000" tIns="45000" bIns="45000"/>
           <a:p>
@@ -3251,7 +2970,7 @@
               </a:lnSpc>
             </a:pPr>
             <a:r>
-              <a:rPr lang="pl-PL">
+              <a:rPr lang="pl-PL" strike="noStrike">
                 <a:solidFill>
                   <a:srgbClr val="000000"/>
                 </a:solidFill>
@@ -3314,28 +3033,32 @@
       </p:grpSpPr>
       <p:sp>
         <p:nvSpPr>
-          <p:cNvPr id="101" name="TextShape 1"/>
+          <p:cNvPr id="95" name="TextShape 1"/>
           <p:cNvSpPr txBox="1"/>
           <p:nvPr/>
         </p:nvSpPr>
         <p:spPr>
           <a:xfrm>
-            <a:off x="838080" y="365040"/>
-            <a:ext cx="10515240" cy="1325160"/>
-          </a:xfrm>
-          <a:prstGeom prst="rect">
-            <a:avLst/>
-          </a:prstGeom>
+            <a:off x="609480" y="367200"/>
+            <a:ext cx="10972440" cy="1144800"/>
+          </a:xfrm>
+          <a:prstGeom prst="rect">
+            <a:avLst/>
+          </a:prstGeom>
+          <a:noFill/>
+          <a:ln>
+            <a:noFill/>
+          </a:ln>
         </p:spPr>
         <p:txBody>
           <a:bodyPr lIns="0" rIns="0" tIns="0" bIns="0" anchor="ctr"/>
           <a:p>
             <a:pPr algn="ctr"/>
             <a:r>
-              <a:rPr lang="en-US" sz="3200">
-                <a:latin typeface="Droid Sans"/>
-              </a:rPr>
-              <a:t>Uzywane algorytmy</a:t>
+              <a:rPr lang="pl-PL" sz="4400">
+                <a:latin typeface="Calibri Light"/>
+              </a:rPr>
+              <a:t>Architektura systemu</a:t>
             </a:r>
             <a:endParaRPr/>
           </a:p>
@@ -3343,20 +3066,18 @@
       </p:sp>
       <p:pic>
         <p:nvPicPr>
-          <p:cNvPr id="102" name="" descr=""/>
+          <p:cNvPr id="96" name="" descr=""/>
           <p:cNvPicPr/>
           <p:nvPr/>
         </p:nvPicPr>
         <p:blipFill>
           <a:blip r:embed="rId1"/>
-          <a:stretch>
-            <a:fillRect/>
-          </a:stretch>
+          <a:stretch/>
         </p:blipFill>
         <p:spPr>
           <a:xfrm>
-            <a:off x="2952000" y="2175480"/>
-            <a:ext cx="6192000" cy="3872520"/>
+            <a:off x="1296000" y="1440000"/>
+            <a:ext cx="9432000" cy="5012280"/>
           </a:xfrm>
           <a:prstGeom prst="rect">
             <a:avLst/>
@@ -3368,6 +3089,33 @@
       </p:pic>
     </p:spTree>
   </p:cSld>
+  <p:timing>
+    <p:tnLst>
+      <p:par>
+        <p:cTn id="19" dur="indefinite" restart="never" nodeType="tmRoot">
+          <p:childTnLst>
+            <p:seq>
+              <p:cTn id="20" nodeType="mainSeq"/>
+              <p:prevCondLst>
+                <p:cond delay="0" evt="onPrev">
+                  <p:tgtEl>
+                    <p:sldTgt/>
+                  </p:tgtEl>
+                </p:cond>
+              </p:prevCondLst>
+              <p:nextCondLst>
+                <p:cond delay="0" evt="onNext">
+                  <p:tgtEl>
+                    <p:sldTgt/>
+                  </p:tgtEl>
+                </p:cond>
+              </p:nextCondLst>
+            </p:seq>
+          </p:childTnLst>
+        </p:cTn>
+      </p:par>
+    </p:tnLst>
+  </p:timing>
 </p:sld>
 </file>
 
@@ -3390,21 +3138,146 @@
       </p:grpSpPr>
       <p:sp>
         <p:nvSpPr>
-          <p:cNvPr id="103" name="TextShape 1"/>
-          <p:cNvSpPr txBox="1"/>
+          <p:cNvPr id="97" name="CustomShape 1"/>
+          <p:cNvSpPr/>
           <p:nvPr/>
         </p:nvSpPr>
         <p:spPr>
           <a:xfrm>
+            <a:off x="838080" y="365040"/>
+            <a:ext cx="10514880" cy="1324800"/>
+          </a:xfrm>
+          <a:prstGeom prst="rect">
+            <a:avLst/>
+          </a:prstGeom>
+          <a:noFill/>
+          <a:ln>
+            <a:noFill/>
+          </a:ln>
+        </p:spPr>
+        <p:style>
+          <a:lnRef idx="0"/>
+          <a:fillRef idx="0"/>
+          <a:effectRef idx="0"/>
+          <a:fontRef idx="minor"/>
+        </p:style>
+        <p:txBody>
+          <a:bodyPr lIns="0" rIns="0" tIns="0" bIns="0" anchor="ctr"/>
+          <a:p>
+            <a:pPr algn="ctr">
+              <a:lnSpc>
+                <a:spcPct val="100000"/>
+              </a:lnSpc>
+            </a:pPr>
+            <a:r>
+              <a:rPr lang="pl-PL" sz="3200" strike="noStrike">
+                <a:latin typeface="Droid Sans"/>
+              </a:rPr>
+              <a:t>Uzywane algorytmy</a:t>
+            </a:r>
+            <a:endParaRPr/>
+          </a:p>
+        </p:txBody>
+      </p:sp>
+      <p:pic>
+        <p:nvPicPr>
+          <p:cNvPr id="98" name="" descr=""/>
+          <p:cNvPicPr/>
+          <p:nvPr/>
+        </p:nvPicPr>
+        <p:blipFill>
+          <a:blip r:embed="rId1"/>
+          <a:stretch/>
+        </p:blipFill>
+        <p:spPr>
+          <a:xfrm>
+            <a:off x="2952000" y="2175480"/>
+            <a:ext cx="6191640" cy="3872160"/>
+          </a:xfrm>
+          <a:prstGeom prst="rect">
+            <a:avLst/>
+          </a:prstGeom>
+          <a:ln>
+            <a:noFill/>
+          </a:ln>
+        </p:spPr>
+      </p:pic>
+    </p:spTree>
+  </p:cSld>
+  <p:timing>
+    <p:tnLst>
+      <p:par>
+        <p:cTn id="21" dur="indefinite" restart="never" nodeType="tmRoot">
+          <p:childTnLst>
+            <p:seq>
+              <p:cTn id="22" nodeType="mainSeq"/>
+              <p:prevCondLst>
+                <p:cond delay="0" evt="onPrev">
+                  <p:tgtEl>
+                    <p:sldTgt/>
+                  </p:tgtEl>
+                </p:cond>
+              </p:prevCondLst>
+              <p:nextCondLst>
+                <p:cond delay="0" evt="onNext">
+                  <p:tgtEl>
+                    <p:sldTgt/>
+                  </p:tgtEl>
+                </p:cond>
+              </p:nextCondLst>
+            </p:seq>
+          </p:childTnLst>
+        </p:cTn>
+      </p:par>
+    </p:tnLst>
+  </p:timing>
+</p:sld>
+</file>
+
+<file path=ppt/slides/slide12.xml><?xml version="1.0" encoding="utf-8"?>
+<p:sld xmlns:a="http://schemas.openxmlformats.org/drawingml/2006/main" xmlns:p="http://schemas.openxmlformats.org/presentationml/2006/main" xmlns:r="http://schemas.openxmlformats.org/officeDocument/2006/relationships">
+  <p:cSld>
+    <p:spTree>
+      <p:nvGrpSpPr>
+        <p:cNvPr id="1" name=""/>
+        <p:cNvGrpSpPr/>
+        <p:nvPr/>
+      </p:nvGrpSpPr>
+      <p:grpSpPr>
+        <a:xfrm>
+          <a:off x="0" y="0"/>
+          <a:ext cx="0" cy="0"/>
+          <a:chOff x="0" y="0"/>
+          <a:chExt cx="0" cy="0"/>
+        </a:xfrm>
+      </p:grpSpPr>
+      <p:sp>
+        <p:nvSpPr>
+          <p:cNvPr id="99" name="CustomShape 1"/>
+          <p:cNvSpPr/>
+          <p:nvPr/>
+        </p:nvSpPr>
+        <p:spPr>
+          <a:xfrm>
             <a:off x="838080" y="2766240"/>
-            <a:ext cx="10515240" cy="1325160"/>
-          </a:xfrm>
-          <a:prstGeom prst="rect">
-            <a:avLst/>
-          </a:prstGeom>
-        </p:spPr>
-        <p:txBody>
-          <a:bodyPr anchor="ctr"/>
+            <a:ext cx="10514880" cy="1324800"/>
+          </a:xfrm>
+          <a:prstGeom prst="rect">
+            <a:avLst/>
+          </a:prstGeom>
+          <a:noFill/>
+          <a:ln>
+            <a:noFill/>
+          </a:ln>
+        </p:spPr>
+        <p:style>
+          <a:lnRef idx="0"/>
+          <a:fillRef idx="0"/>
+          <a:effectRef idx="0"/>
+          <a:fontRef idx="minor"/>
+        </p:style>
+        <p:txBody>
+          <a:bodyPr lIns="90000" rIns="90000" tIns="45000" bIns="45000" anchor="ctr"/>
           <a:p>
             <a:pPr>
               <a:lnSpc>
@@ -3412,7 +3285,7 @@
               </a:lnSpc>
             </a:pPr>
             <a:r>
-              <a:rPr lang="en-US" sz="4400">
+              <a:rPr lang="pl-PL" sz="4400" strike="noStrike">
                 <a:solidFill>
                   <a:srgbClr val="000000"/>
                 </a:solidFill>
@@ -3421,7 +3294,7 @@
               <a:t>              </a:t>
             </a:r>
             <a:r>
-              <a:rPr lang="en-US" sz="4400">
+              <a:rPr lang="pl-PL" sz="4400" strike="noStrike">
                 <a:solidFill>
                   <a:srgbClr val="000000"/>
                 </a:solidFill>
@@ -3438,10 +3311,10 @@
   <p:timing>
     <p:tnLst>
       <p:par>
-        <p:cTn id="19" dur="indefinite" restart="never" nodeType="tmRoot">
+        <p:cTn id="23" dur="indefinite" restart="never" nodeType="tmRoot">
           <p:childTnLst>
             <p:seq>
-              <p:cTn id="20" nodeType="mainSeq"/>
+              <p:cTn id="24" nodeType="mainSeq"/>
               <p:prevCondLst>
                 <p:cond delay="0" evt="onPrev">
                   <p:tgtEl>
@@ -3484,21 +3357,31 @@
       </p:grpSpPr>
       <p:sp>
         <p:nvSpPr>
-          <p:cNvPr id="82" name="TextShape 1"/>
-          <p:cNvSpPr txBox="1"/>
+          <p:cNvPr id="76" name="CustomShape 1"/>
+          <p:cNvSpPr/>
           <p:nvPr/>
         </p:nvSpPr>
         <p:spPr>
           <a:xfrm>
             <a:off x="838080" y="2662200"/>
-            <a:ext cx="10515240" cy="1325160"/>
-          </a:xfrm>
-          <a:prstGeom prst="rect">
-            <a:avLst/>
-          </a:prstGeom>
-        </p:spPr>
-        <p:txBody>
-          <a:bodyPr anchor="ctr"/>
+            <a:ext cx="10514880" cy="1324800"/>
+          </a:xfrm>
+          <a:prstGeom prst="rect">
+            <a:avLst/>
+          </a:prstGeom>
+          <a:noFill/>
+          <a:ln>
+            <a:noFill/>
+          </a:ln>
+        </p:spPr>
+        <p:style>
+          <a:lnRef idx="0"/>
+          <a:fillRef idx="0"/>
+          <a:effectRef idx="0"/>
+          <a:fontRef idx="minor"/>
+        </p:style>
+        <p:txBody>
+          <a:bodyPr lIns="90000" rIns="90000" tIns="45000" bIns="45000" anchor="ctr"/>
           <a:p>
             <a:pPr>
               <a:lnSpc>
@@ -3506,7 +3389,7 @@
               </a:lnSpc>
             </a:pPr>
             <a:r>
-              <a:rPr lang="en-US" sz="4400">
+              <a:rPr lang="pl-PL" sz="4400" strike="noStrike">
                 <a:solidFill>
                   <a:srgbClr val="000000"/>
                 </a:solidFill>
@@ -3515,7 +3398,7 @@
               <a:t>                         </a:t>
             </a:r>
             <a:r>
-              <a:rPr lang="en-US" sz="7200">
+              <a:rPr lang="pl-PL" sz="7200" strike="noStrike">
                 <a:solidFill>
                   <a:srgbClr val="000000"/>
                 </a:solidFill>
@@ -3578,20 +3461,18 @@
       </p:grpSpPr>
       <p:pic>
         <p:nvPicPr>
-          <p:cNvPr id="83" name="Picture 5" descr=""/>
+          <p:cNvPr id="77" name="Picture 5" descr=""/>
           <p:cNvPicPr/>
           <p:nvPr/>
         </p:nvPicPr>
         <p:blipFill>
           <a:blip r:embed="rId1"/>
-          <a:stretch>
-            <a:fillRect/>
-          </a:stretch>
+          <a:stretch/>
         </p:blipFill>
         <p:spPr>
           <a:xfrm>
             <a:off x="0" y="0"/>
-            <a:ext cx="12191760" cy="6857640"/>
+            <a:ext cx="12191400" cy="6857280"/>
           </a:xfrm>
           <a:prstGeom prst="rect">
             <a:avLst/>
@@ -3652,20 +3533,18 @@
       </p:grpSpPr>
       <p:pic>
         <p:nvPicPr>
-          <p:cNvPr id="84" name="Picture 3" descr=""/>
+          <p:cNvPr id="78" name="Picture 3" descr=""/>
           <p:cNvPicPr/>
           <p:nvPr/>
         </p:nvPicPr>
         <p:blipFill>
           <a:blip r:embed="rId1"/>
-          <a:stretch>
-            <a:fillRect/>
-          </a:stretch>
+          <a:stretch/>
         </p:blipFill>
         <p:spPr>
           <a:xfrm>
             <a:off x="0" y="0"/>
-            <a:ext cx="12191760" cy="6857640"/>
+            <a:ext cx="12191400" cy="6857280"/>
           </a:xfrm>
           <a:prstGeom prst="rect">
             <a:avLst/>
@@ -3726,21 +3605,31 @@
       </p:grpSpPr>
       <p:sp>
         <p:nvSpPr>
-          <p:cNvPr id="85" name="TextShape 1"/>
-          <p:cNvSpPr txBox="1"/>
+          <p:cNvPr id="79" name="CustomShape 1"/>
+          <p:cNvSpPr/>
           <p:nvPr/>
         </p:nvSpPr>
         <p:spPr>
           <a:xfrm>
             <a:off x="838080" y="365040"/>
-            <a:ext cx="10515240" cy="1325160"/>
-          </a:xfrm>
-          <a:prstGeom prst="rect">
-            <a:avLst/>
-          </a:prstGeom>
-        </p:spPr>
-        <p:txBody>
-          <a:bodyPr anchor="ctr"/>
+            <a:ext cx="10514880" cy="1324800"/>
+          </a:xfrm>
+          <a:prstGeom prst="rect">
+            <a:avLst/>
+          </a:prstGeom>
+          <a:noFill/>
+          <a:ln>
+            <a:noFill/>
+          </a:ln>
+        </p:spPr>
+        <p:style>
+          <a:lnRef idx="0"/>
+          <a:fillRef idx="0"/>
+          <a:effectRef idx="0"/>
+          <a:fontRef idx="minor"/>
+        </p:style>
+        <p:txBody>
+          <a:bodyPr lIns="90000" rIns="90000" tIns="45000" bIns="45000" anchor="ctr"/>
           <a:p>
             <a:pPr>
               <a:lnSpc>
@@ -3748,7 +3637,7 @@
               </a:lnSpc>
             </a:pPr>
             <a:r>
-              <a:rPr lang="en-US" sz="4400">
+              <a:rPr lang="pl-PL" sz="4400" strike="noStrike">
                 <a:solidFill>
                   <a:srgbClr val="000000"/>
                 </a:solidFill>
@@ -3757,7 +3646,7 @@
               <a:t>                  </a:t>
             </a:r>
             <a:r>
-              <a:rPr lang="en-US" sz="4400">
+              <a:rPr lang="pl-PL" sz="4400" strike="noStrike">
                 <a:solidFill>
                   <a:srgbClr val="000000"/>
                 </a:solidFill>
@@ -3771,21 +3660,31 @@
       </p:sp>
       <p:sp>
         <p:nvSpPr>
-          <p:cNvPr id="86" name="TextShape 2"/>
-          <p:cNvSpPr txBox="1"/>
+          <p:cNvPr id="80" name="CustomShape 2"/>
+          <p:cNvSpPr/>
           <p:nvPr/>
         </p:nvSpPr>
         <p:spPr>
           <a:xfrm>
             <a:off x="838080" y="1825560"/>
-            <a:ext cx="10515240" cy="4350960"/>
-          </a:xfrm>
-          <a:prstGeom prst="rect">
-            <a:avLst/>
-          </a:prstGeom>
-        </p:spPr>
-        <p:txBody>
-          <a:bodyPr/>
+            <a:ext cx="10514880" cy="4350600"/>
+          </a:xfrm>
+          <a:prstGeom prst="rect">
+            <a:avLst/>
+          </a:prstGeom>
+          <a:noFill/>
+          <a:ln>
+            <a:noFill/>
+          </a:ln>
+        </p:spPr>
+        <p:style>
+          <a:lnRef idx="0"/>
+          <a:fillRef idx="0"/>
+          <a:effectRef idx="0"/>
+          <a:fontRef idx="minor"/>
+        </p:style>
+        <p:txBody>
+          <a:bodyPr lIns="90000" rIns="90000" tIns="45000" bIns="45000"/>
           <a:p>
             <a:pPr>
               <a:lnSpc>
@@ -3795,7 +3694,7 @@
               <a:buChar char="•"/>
             </a:pPr>
             <a:r>
-              <a:rPr lang="en-US" sz="2800">
+              <a:rPr lang="pl-PL" sz="2800" strike="noStrike">
                 <a:solidFill>
                   <a:srgbClr val="000000"/>
                 </a:solidFill>
@@ -3814,7 +3713,7 @@
               <a:buChar char="•"/>
             </a:pPr>
             <a:r>
-              <a:rPr lang="en-US" sz="2400">
+              <a:rPr lang="pl-PL" sz="2400" strike="noStrike">
                 <a:solidFill>
                   <a:srgbClr val="000000"/>
                 </a:solidFill>
@@ -3833,7 +3732,7 @@
               <a:buChar char="•"/>
             </a:pPr>
             <a:r>
-              <a:rPr lang="en-US" sz="2400">
+              <a:rPr lang="pl-PL" sz="2400" strike="noStrike">
                 <a:solidFill>
                   <a:srgbClr val="000000"/>
                 </a:solidFill>
@@ -3850,7 +3749,7 @@
               </a:lnSpc>
             </a:pPr>
             <a:r>
-              <a:rPr lang="en-US" sz="2800">
+              <a:rPr lang="pl-PL" sz="2800" strike="noStrike">
                 <a:solidFill>
                   <a:srgbClr val="000000"/>
                 </a:solidFill>
@@ -3913,21 +3812,31 @@
       </p:grpSpPr>
       <p:sp>
         <p:nvSpPr>
-          <p:cNvPr id="87" name="TextShape 1"/>
-          <p:cNvSpPr txBox="1"/>
+          <p:cNvPr id="81" name="CustomShape 1"/>
+          <p:cNvSpPr/>
           <p:nvPr/>
         </p:nvSpPr>
         <p:spPr>
           <a:xfrm>
             <a:off x="838080" y="365040"/>
-            <a:ext cx="10515240" cy="1325160"/>
-          </a:xfrm>
-          <a:prstGeom prst="rect">
-            <a:avLst/>
-          </a:prstGeom>
-        </p:spPr>
-        <p:txBody>
-          <a:bodyPr anchor="ctr"/>
+            <a:ext cx="10514880" cy="1324800"/>
+          </a:xfrm>
+          <a:prstGeom prst="rect">
+            <a:avLst/>
+          </a:prstGeom>
+          <a:noFill/>
+          <a:ln>
+            <a:noFill/>
+          </a:ln>
+        </p:spPr>
+        <p:style>
+          <a:lnRef idx="0"/>
+          <a:fillRef idx="0"/>
+          <a:effectRef idx="0"/>
+          <a:fontRef idx="minor"/>
+        </p:style>
+        <p:txBody>
+          <a:bodyPr lIns="90000" rIns="90000" tIns="45000" bIns="45000" anchor="ctr"/>
           <a:p>
             <a:pPr>
               <a:lnSpc>
@@ -3935,7 +3844,7 @@
               </a:lnSpc>
             </a:pPr>
             <a:r>
-              <a:rPr lang="en-US" sz="4400">
+              <a:rPr lang="pl-PL" sz="4400" strike="noStrike">
                 <a:solidFill>
                   <a:srgbClr val="000000"/>
                 </a:solidFill>
@@ -3944,7 +3853,7 @@
               <a:t>                  </a:t>
             </a:r>
             <a:r>
-              <a:rPr lang="en-US" sz="4400">
+              <a:rPr lang="pl-PL" sz="4400" strike="noStrike">
                 <a:solidFill>
                   <a:srgbClr val="000000"/>
                 </a:solidFill>
@@ -3958,21 +3867,31 @@
       </p:sp>
       <p:sp>
         <p:nvSpPr>
-          <p:cNvPr id="88" name="TextShape 2"/>
-          <p:cNvSpPr txBox="1"/>
+          <p:cNvPr id="82" name="CustomShape 2"/>
+          <p:cNvSpPr/>
           <p:nvPr/>
         </p:nvSpPr>
         <p:spPr>
           <a:xfrm>
             <a:off x="838080" y="1825560"/>
-            <a:ext cx="10515240" cy="4723560"/>
-          </a:xfrm>
-          <a:prstGeom prst="rect">
-            <a:avLst/>
-          </a:prstGeom>
-        </p:spPr>
-        <p:txBody>
-          <a:bodyPr/>
+            <a:ext cx="10514880" cy="4723200"/>
+          </a:xfrm>
+          <a:prstGeom prst="rect">
+            <a:avLst/>
+          </a:prstGeom>
+          <a:noFill/>
+          <a:ln>
+            <a:noFill/>
+          </a:ln>
+        </p:spPr>
+        <p:style>
+          <a:lnRef idx="0"/>
+          <a:fillRef idx="0"/>
+          <a:effectRef idx="0"/>
+          <a:fontRef idx="minor"/>
+        </p:style>
+        <p:txBody>
+          <a:bodyPr lIns="90000" rIns="90000" tIns="45000" bIns="45000"/>
           <a:p>
             <a:pPr>
               <a:lnSpc>
@@ -3982,7 +3901,7 @@
               <a:buChar char="•"/>
             </a:pPr>
             <a:r>
-              <a:rPr lang="en-US" sz="2800">
+              <a:rPr lang="pl-PL" sz="2800" strike="noStrike">
                 <a:solidFill>
                   <a:srgbClr val="000000"/>
                 </a:solidFill>
@@ -4001,7 +3920,7 @@
               <a:buChar char="•"/>
             </a:pPr>
             <a:r>
-              <a:rPr lang="en-US" sz="2400">
+              <a:rPr lang="pl-PL" sz="2400" strike="noStrike">
                 <a:solidFill>
                   <a:srgbClr val="000000"/>
                 </a:solidFill>
@@ -4020,7 +3939,7 @@
               <a:buChar char="•"/>
             </a:pPr>
             <a:r>
-              <a:rPr lang="en-US" sz="2400">
+              <a:rPr lang="pl-PL" sz="2400" strike="noStrike">
                 <a:solidFill>
                   <a:srgbClr val="000000"/>
                 </a:solidFill>
@@ -4039,7 +3958,7 @@
               <a:buChar char="•"/>
             </a:pPr>
             <a:r>
-              <a:rPr lang="en-US" sz="2800">
+              <a:rPr lang="pl-PL" sz="2800" strike="noStrike">
                 <a:solidFill>
                   <a:srgbClr val="000000"/>
                 </a:solidFill>
@@ -4048,7 +3967,7 @@
               <a:t>Student który jest ciekaw konkretnego przedmiotu </a:t>
             </a:r>
             <a:r>
-              <a:rPr lang="en-US" sz="2800">
+              <a:rPr lang="pl-PL" sz="2800" strike="noStrike">
                 <a:solidFill>
                   <a:srgbClr val="000000"/>
                 </a:solidFill>
@@ -4067,7 +3986,7 @@
               <a:buChar char="•"/>
             </a:pPr>
             <a:r>
-              <a:rPr lang="en-US" sz="2400">
+              <a:rPr lang="pl-PL" sz="2400" strike="noStrike">
                 <a:solidFill>
                   <a:srgbClr val="000000"/>
                 </a:solidFill>
@@ -4086,7 +4005,7 @@
               <a:buChar char="•"/>
             </a:pPr>
             <a:r>
-              <a:rPr lang="en-US" sz="2400">
+              <a:rPr lang="pl-PL" sz="2400" strike="noStrike">
                 <a:solidFill>
                   <a:srgbClr val="000000"/>
                 </a:solidFill>
@@ -4103,7 +4022,7 @@
               </a:lnSpc>
             </a:pPr>
             <a:r>
-              <a:rPr lang="en-US" sz="2800">
+              <a:rPr lang="pl-PL" sz="2800" strike="noStrike">
                 <a:solidFill>
                   <a:srgbClr val="000000"/>
                 </a:solidFill>
@@ -4166,21 +4085,31 @@
       </p:grpSpPr>
       <p:sp>
         <p:nvSpPr>
-          <p:cNvPr id="89" name="TextShape 1"/>
-          <p:cNvSpPr txBox="1"/>
+          <p:cNvPr id="83" name="CustomShape 1"/>
+          <p:cNvSpPr/>
           <p:nvPr/>
         </p:nvSpPr>
         <p:spPr>
           <a:xfrm>
             <a:off x="838080" y="365040"/>
-            <a:ext cx="10515240" cy="1325160"/>
-          </a:xfrm>
-          <a:prstGeom prst="rect">
-            <a:avLst/>
-          </a:prstGeom>
-        </p:spPr>
-        <p:txBody>
-          <a:bodyPr anchor="ctr"/>
+            <a:ext cx="10514880" cy="1324800"/>
+          </a:xfrm>
+          <a:prstGeom prst="rect">
+            <a:avLst/>
+          </a:prstGeom>
+          <a:noFill/>
+          <a:ln>
+            <a:noFill/>
+          </a:ln>
+        </p:spPr>
+        <p:style>
+          <a:lnRef idx="0"/>
+          <a:fillRef idx="0"/>
+          <a:effectRef idx="0"/>
+          <a:fontRef idx="minor"/>
+        </p:style>
+        <p:txBody>
+          <a:bodyPr lIns="90000" rIns="90000" tIns="45000" bIns="45000" anchor="ctr"/>
           <a:p>
             <a:pPr>
               <a:lnSpc>
@@ -4188,7 +4117,7 @@
               </a:lnSpc>
             </a:pPr>
             <a:r>
-              <a:rPr lang="en-US" sz="4400">
+              <a:rPr lang="pl-PL" sz="4400" strike="noStrike">
                 <a:solidFill>
                   <a:srgbClr val="000000"/>
                 </a:solidFill>
@@ -4197,7 +4126,7 @@
               <a:t>                  </a:t>
             </a:r>
             <a:r>
-              <a:rPr lang="en-US" sz="4400">
+              <a:rPr lang="pl-PL" sz="4400" strike="noStrike">
                 <a:solidFill>
                   <a:srgbClr val="000000"/>
                 </a:solidFill>
@@ -4211,21 +4140,31 @@
       </p:sp>
       <p:sp>
         <p:nvSpPr>
-          <p:cNvPr id="90" name="TextShape 2"/>
-          <p:cNvSpPr txBox="1"/>
+          <p:cNvPr id="84" name="CustomShape 2"/>
+          <p:cNvSpPr/>
           <p:nvPr/>
         </p:nvSpPr>
         <p:spPr>
           <a:xfrm>
             <a:off x="838080" y="1825560"/>
-            <a:ext cx="10515240" cy="4350960"/>
-          </a:xfrm>
-          <a:prstGeom prst="rect">
-            <a:avLst/>
-          </a:prstGeom>
-        </p:spPr>
-        <p:txBody>
-          <a:bodyPr/>
+            <a:ext cx="10514880" cy="4350600"/>
+          </a:xfrm>
+          <a:prstGeom prst="rect">
+            <a:avLst/>
+          </a:prstGeom>
+          <a:noFill/>
+          <a:ln>
+            <a:noFill/>
+          </a:ln>
+        </p:spPr>
+        <p:style>
+          <a:lnRef idx="0"/>
+          <a:fillRef idx="0"/>
+          <a:effectRef idx="0"/>
+          <a:fontRef idx="minor"/>
+        </p:style>
+        <p:txBody>
+          <a:bodyPr lIns="90000" rIns="90000" tIns="45000" bIns="45000"/>
           <a:p>
             <a:pPr>
               <a:lnSpc>
@@ -4235,7 +4174,7 @@
               <a:buChar char="•"/>
             </a:pPr>
             <a:r>
-              <a:rPr lang="en-US" sz="2800">
+              <a:rPr lang="pl-PL" sz="2800" strike="noStrike">
                 <a:solidFill>
                   <a:srgbClr val="000000"/>
                 </a:solidFill>
@@ -4254,7 +4193,7 @@
               <a:buChar char="•"/>
             </a:pPr>
             <a:r>
-              <a:rPr lang="en-US" sz="2400">
+              <a:rPr lang="pl-PL" sz="2400" strike="noStrike">
                 <a:solidFill>
                   <a:srgbClr val="000000"/>
                 </a:solidFill>
@@ -4273,7 +4212,7 @@
               <a:buChar char="•"/>
             </a:pPr>
             <a:r>
-              <a:rPr lang="en-US" sz="2400">
+              <a:rPr lang="pl-PL" sz="2400" strike="noStrike">
                 <a:solidFill>
                   <a:srgbClr val="000000"/>
                 </a:solidFill>
@@ -4336,21 +4275,31 @@
       </p:grpSpPr>
       <p:sp>
         <p:nvSpPr>
-          <p:cNvPr id="91" name="TextShape 1"/>
-          <p:cNvSpPr txBox="1"/>
+          <p:cNvPr id="85" name="CustomShape 1"/>
+          <p:cNvSpPr/>
           <p:nvPr/>
         </p:nvSpPr>
         <p:spPr>
           <a:xfrm>
             <a:off x="838080" y="365040"/>
-            <a:ext cx="10515240" cy="1325160"/>
-          </a:xfrm>
-          <a:prstGeom prst="rect">
-            <a:avLst/>
-          </a:prstGeom>
-        </p:spPr>
-        <p:txBody>
-          <a:bodyPr anchor="ctr"/>
+            <a:ext cx="10514880" cy="1324800"/>
+          </a:xfrm>
+          <a:prstGeom prst="rect">
+            <a:avLst/>
+          </a:prstGeom>
+          <a:noFill/>
+          <a:ln>
+            <a:noFill/>
+          </a:ln>
+        </p:spPr>
+        <p:style>
+          <a:lnRef idx="0"/>
+          <a:fillRef idx="0"/>
+          <a:effectRef idx="0"/>
+          <a:fontRef idx="minor"/>
+        </p:style>
+        <p:txBody>
+          <a:bodyPr lIns="90000" rIns="90000" tIns="45000" bIns="45000" anchor="ctr"/>
           <a:p>
             <a:pPr>
               <a:lnSpc>
@@ -4358,7 +4307,7 @@
               </a:lnSpc>
             </a:pPr>
             <a:r>
-              <a:rPr lang="en-US" sz="4400">
+              <a:rPr lang="pl-PL" sz="4400" strike="noStrike">
                 <a:solidFill>
                   <a:srgbClr val="000000"/>
                 </a:solidFill>
@@ -4367,7 +4316,7 @@
               <a:t>                    </a:t>
             </a:r>
             <a:r>
-              <a:rPr lang="en-US" sz="4400">
+              <a:rPr lang="pl-PL" sz="4400" strike="noStrike">
                 <a:solidFill>
                   <a:srgbClr val="000000"/>
                 </a:solidFill>
@@ -4381,20 +4330,18 @@
       </p:sp>
       <p:pic>
         <p:nvPicPr>
-          <p:cNvPr id="92" name="Picture 3" descr=""/>
+          <p:cNvPr id="86" name="Picture 3" descr=""/>
           <p:cNvPicPr/>
           <p:nvPr/>
         </p:nvPicPr>
         <p:blipFill>
           <a:blip r:embed="rId1"/>
-          <a:stretch>
-            <a:fillRect/>
-          </a:stretch>
+          <a:stretch/>
         </p:blipFill>
         <p:spPr>
           <a:xfrm>
             <a:off x="7273800" y="3709800"/>
-            <a:ext cx="2972880" cy="1906200"/>
+            <a:ext cx="2972520" cy="1905840"/>
           </a:xfrm>
           <a:prstGeom prst="rect">
             <a:avLst/>
@@ -4406,20 +4353,18 @@
       </p:pic>
       <p:pic>
         <p:nvPicPr>
-          <p:cNvPr id="93" name="Picture 4" descr=""/>
+          <p:cNvPr id="87" name="Picture 4" descr=""/>
           <p:cNvPicPr/>
           <p:nvPr/>
         </p:nvPicPr>
         <p:blipFill>
           <a:blip r:embed="rId2"/>
-          <a:stretch>
-            <a:fillRect/>
-          </a:stretch>
+          <a:stretch/>
         </p:blipFill>
         <p:spPr>
           <a:xfrm>
             <a:off x="661680" y="3585240"/>
-            <a:ext cx="4987440" cy="1342800"/>
+            <a:ext cx="4987080" cy="1342440"/>
           </a:xfrm>
           <a:prstGeom prst="rect">
             <a:avLst/>
@@ -4431,20 +4376,18 @@
       </p:pic>
       <p:pic>
         <p:nvPicPr>
-          <p:cNvPr id="94" name="Picture 6" descr=""/>
+          <p:cNvPr id="88" name="Picture 6" descr=""/>
           <p:cNvPicPr/>
           <p:nvPr/>
         </p:nvPicPr>
         <p:blipFill>
           <a:blip r:embed="rId3"/>
-          <a:stretch>
-            <a:fillRect/>
-          </a:stretch>
+          <a:stretch/>
         </p:blipFill>
         <p:spPr>
           <a:xfrm>
             <a:off x="6266160" y="1841400"/>
-            <a:ext cx="4987440" cy="1342800"/>
+            <a:ext cx="4987080" cy="1342440"/>
           </a:xfrm>
           <a:prstGeom prst="rect">
             <a:avLst/>
@@ -4456,14 +4399,14 @@
       </p:pic>
       <p:sp>
         <p:nvSpPr>
-          <p:cNvPr id="95" name="CustomShape 2"/>
+          <p:cNvPr id="89" name="CustomShape 2"/>
           <p:cNvSpPr/>
           <p:nvPr/>
         </p:nvSpPr>
         <p:spPr>
           <a:xfrm>
             <a:off x="7273800" y="5974920"/>
-            <a:ext cx="3553200" cy="638280"/>
+            <a:ext cx="3552840" cy="637920"/>
           </a:xfrm>
           <a:prstGeom prst="rect">
             <a:avLst/>
@@ -4473,23 +4416,27 @@
             <a:noFill/>
           </a:ln>
         </p:spPr>
+        <p:style>
+          <a:lnRef idx="0"/>
+          <a:fillRef idx="0"/>
+          <a:effectRef idx="0"/>
+          <a:fontRef idx="minor"/>
+        </p:style>
       </p:sp>
       <p:pic>
         <p:nvPicPr>
-          <p:cNvPr id="96" name="Picture 2" descr=""/>
+          <p:cNvPr id="90" name="Picture 2" descr=""/>
           <p:cNvPicPr/>
           <p:nvPr/>
         </p:nvPicPr>
         <p:blipFill>
           <a:blip r:embed="rId4"/>
-          <a:stretch>
-            <a:fillRect/>
-          </a:stretch>
+          <a:stretch/>
         </p:blipFill>
         <p:spPr>
           <a:xfrm>
             <a:off x="661680" y="5165640"/>
-            <a:ext cx="4987440" cy="1422000"/>
+            <a:ext cx="4987080" cy="1421640"/>
           </a:xfrm>
           <a:prstGeom prst="rect">
             <a:avLst/>
@@ -4501,20 +4448,18 @@
       </p:pic>
       <p:pic>
         <p:nvPicPr>
-          <p:cNvPr id="97" name="" descr=""/>
+          <p:cNvPr id="91" name="" descr=""/>
           <p:cNvPicPr/>
           <p:nvPr/>
         </p:nvPicPr>
         <p:blipFill>
           <a:blip r:embed="rId5"/>
-          <a:stretch>
-            <a:fillRect/>
-          </a:stretch>
+          <a:stretch/>
         </p:blipFill>
         <p:spPr>
           <a:xfrm>
             <a:off x="648000" y="1884600"/>
-            <a:ext cx="4968000" cy="1405800"/>
+            <a:ext cx="4967640" cy="1405440"/>
           </a:xfrm>
           <a:prstGeom prst="rect">
             <a:avLst/>
@@ -4526,20 +4471,18 @@
       </p:pic>
       <p:pic>
         <p:nvPicPr>
-          <p:cNvPr id="98" name="" descr=""/>
+          <p:cNvPr id="92" name="" descr=""/>
           <p:cNvPicPr/>
           <p:nvPr/>
         </p:nvPicPr>
         <p:blipFill>
           <a:blip r:embed="rId6"/>
-          <a:stretch>
-            <a:fillRect/>
-          </a:stretch>
+          <a:stretch/>
         </p:blipFill>
         <p:spPr>
           <a:xfrm>
             <a:off x="7658640" y="5718240"/>
-            <a:ext cx="2133360" cy="761760"/>
+            <a:ext cx="2133000" cy="761400"/>
           </a:xfrm>
           <a:prstGeom prst="rect">
             <a:avLst/>
@@ -4600,21 +4543,31 @@
       </p:grpSpPr>
       <p:sp>
         <p:nvSpPr>
-          <p:cNvPr id="99" name="TextShape 1"/>
-          <p:cNvSpPr txBox="1"/>
+          <p:cNvPr id="93" name="CustomShape 1"/>
+          <p:cNvSpPr/>
           <p:nvPr/>
         </p:nvSpPr>
         <p:spPr>
           <a:xfrm>
             <a:off x="838080" y="365040"/>
-            <a:ext cx="10515240" cy="1325160"/>
-          </a:xfrm>
-          <a:prstGeom prst="rect">
-            <a:avLst/>
-          </a:prstGeom>
-        </p:spPr>
-        <p:txBody>
-          <a:bodyPr anchor="ctr"/>
+            <a:ext cx="10514880" cy="1324800"/>
+          </a:xfrm>
+          <a:prstGeom prst="rect">
+            <a:avLst/>
+          </a:prstGeom>
+          <a:noFill/>
+          <a:ln>
+            <a:noFill/>
+          </a:ln>
+        </p:spPr>
+        <p:style>
+          <a:lnRef idx="0"/>
+          <a:fillRef idx="0"/>
+          <a:effectRef idx="0"/>
+          <a:fontRef idx="minor"/>
+        </p:style>
+        <p:txBody>
+          <a:bodyPr lIns="90000" rIns="90000" tIns="45000" bIns="45000" anchor="ctr"/>
           <a:p>
             <a:pPr>
               <a:lnSpc>
@@ -4622,7 +4575,7 @@
               </a:lnSpc>
             </a:pPr>
             <a:r>
-              <a:rPr lang="en-US" sz="4400">
+              <a:rPr lang="pl-PL" sz="4400" strike="noStrike">
                 <a:solidFill>
                   <a:srgbClr val="000000"/>
                 </a:solidFill>
@@ -4631,7 +4584,7 @@
               <a:t>                          </a:t>
             </a:r>
             <a:r>
-              <a:rPr lang="en-US" sz="4400">
+              <a:rPr lang="pl-PL" sz="4400" strike="noStrike">
                 <a:solidFill>
                   <a:srgbClr val="000000"/>
                 </a:solidFill>
@@ -4645,20 +4598,18 @@
       </p:sp>
       <p:pic>
         <p:nvPicPr>
-          <p:cNvPr id="100" name="Picture 3" descr=""/>
+          <p:cNvPr id="94" name="" descr=""/>
           <p:cNvPicPr/>
           <p:nvPr/>
         </p:nvPicPr>
         <p:blipFill>
           <a:blip r:embed="rId1"/>
-          <a:stretch>
-            <a:fillRect/>
-          </a:stretch>
+          <a:stretch/>
         </p:blipFill>
         <p:spPr>
           <a:xfrm>
-            <a:off x="581760" y="1690560"/>
-            <a:ext cx="10671120" cy="4637160"/>
+            <a:off x="1080000" y="1728000"/>
+            <a:ext cx="9864000" cy="4680000"/>
           </a:xfrm>
           <a:prstGeom prst="rect">
             <a:avLst/>

</xml_diff>